<commit_message>
Caminhos 1, 2, 3, 4
</commit_message>
<xml_diff>
--- a/Fluxo_Pesquisa.pptx
+++ b/Fluxo_Pesquisa.pptx
@@ -10,6 +10,10 @@
     <p:sldId id="258" r:id="rId4"/>
     <p:sldId id="259" r:id="rId5"/>
     <p:sldId id="260" r:id="rId6"/>
+    <p:sldId id="261" r:id="rId7"/>
+    <p:sldId id="263" r:id="rId8"/>
+    <p:sldId id="264" r:id="rId9"/>
+    <p:sldId id="262" r:id="rId10"/>
   </p:sldIdLst>
   <p:sldSz cx="6858000" cy="9906000" type="A4"/>
   <p:notesSz cx="6858000" cy="9144000"/>
@@ -108,6 +112,11 @@
       </a:defRPr>
     </a:lvl9pPr>
   </p:defaultTextStyle>
+  <p:extLst>
+    <p:ext uri="{EFAFB233-063F-42B5-8137-9DF3F51BA10A}">
+      <p15:sldGuideLst xmlns:p15="http://schemas.microsoft.com/office/powerpoint/2012/main"/>
+    </p:ext>
+  </p:extLst>
 </p:presentation>
 </file>
 
@@ -242,7 +251,7 @@
           <a:p>
             <a:fld id="{A14DA654-4032-48DC-B1A3-5B71DA7F5F6B}" type="datetimeFigureOut">
               <a:rPr lang="pt-BR" smtClean="0"/>
-              <a:t>21/08/2021</a:t>
+              <a:t>22/08/2021</a:t>
             </a:fld>
             <a:endParaRPr lang="pt-BR"/>
           </a:p>
@@ -412,7 +421,7 @@
           <a:p>
             <a:fld id="{A14DA654-4032-48DC-B1A3-5B71DA7F5F6B}" type="datetimeFigureOut">
               <a:rPr lang="pt-BR" smtClean="0"/>
-              <a:t>21/08/2021</a:t>
+              <a:t>22/08/2021</a:t>
             </a:fld>
             <a:endParaRPr lang="pt-BR"/>
           </a:p>
@@ -592,7 +601,7 @@
           <a:p>
             <a:fld id="{A14DA654-4032-48DC-B1A3-5B71DA7F5F6B}" type="datetimeFigureOut">
               <a:rPr lang="pt-BR" smtClean="0"/>
-              <a:t>21/08/2021</a:t>
+              <a:t>22/08/2021</a:t>
             </a:fld>
             <a:endParaRPr lang="pt-BR"/>
           </a:p>
@@ -762,7 +771,7 @@
           <a:p>
             <a:fld id="{A14DA654-4032-48DC-B1A3-5B71DA7F5F6B}" type="datetimeFigureOut">
               <a:rPr lang="pt-BR" smtClean="0"/>
-              <a:t>21/08/2021</a:t>
+              <a:t>22/08/2021</a:t>
             </a:fld>
             <a:endParaRPr lang="pt-BR"/>
           </a:p>
@@ -1006,7 +1015,7 @@
           <a:p>
             <a:fld id="{A14DA654-4032-48DC-B1A3-5B71DA7F5F6B}" type="datetimeFigureOut">
               <a:rPr lang="pt-BR" smtClean="0"/>
-              <a:t>21/08/2021</a:t>
+              <a:t>22/08/2021</a:t>
             </a:fld>
             <a:endParaRPr lang="pt-BR"/>
           </a:p>
@@ -1238,7 +1247,7 @@
           <a:p>
             <a:fld id="{A14DA654-4032-48DC-B1A3-5B71DA7F5F6B}" type="datetimeFigureOut">
               <a:rPr lang="pt-BR" smtClean="0"/>
-              <a:t>21/08/2021</a:t>
+              <a:t>22/08/2021</a:t>
             </a:fld>
             <a:endParaRPr lang="pt-BR"/>
           </a:p>
@@ -1605,7 +1614,7 @@
           <a:p>
             <a:fld id="{A14DA654-4032-48DC-B1A3-5B71DA7F5F6B}" type="datetimeFigureOut">
               <a:rPr lang="pt-BR" smtClean="0"/>
-              <a:t>21/08/2021</a:t>
+              <a:t>22/08/2021</a:t>
             </a:fld>
             <a:endParaRPr lang="pt-BR"/>
           </a:p>
@@ -1723,7 +1732,7 @@
           <a:p>
             <a:fld id="{A14DA654-4032-48DC-B1A3-5B71DA7F5F6B}" type="datetimeFigureOut">
               <a:rPr lang="pt-BR" smtClean="0"/>
-              <a:t>21/08/2021</a:t>
+              <a:t>22/08/2021</a:t>
             </a:fld>
             <a:endParaRPr lang="pt-BR"/>
           </a:p>
@@ -1818,7 +1827,7 @@
           <a:p>
             <a:fld id="{A14DA654-4032-48DC-B1A3-5B71DA7F5F6B}" type="datetimeFigureOut">
               <a:rPr lang="pt-BR" smtClean="0"/>
-              <a:t>21/08/2021</a:t>
+              <a:t>22/08/2021</a:t>
             </a:fld>
             <a:endParaRPr lang="pt-BR"/>
           </a:p>
@@ -2095,7 +2104,7 @@
           <a:p>
             <a:fld id="{A14DA654-4032-48DC-B1A3-5B71DA7F5F6B}" type="datetimeFigureOut">
               <a:rPr lang="pt-BR" smtClean="0"/>
-              <a:t>21/08/2021</a:t>
+              <a:t>22/08/2021</a:t>
             </a:fld>
             <a:endParaRPr lang="pt-BR"/>
           </a:p>
@@ -2352,7 +2361,7 @@
           <a:p>
             <a:fld id="{A14DA654-4032-48DC-B1A3-5B71DA7F5F6B}" type="datetimeFigureOut">
               <a:rPr lang="pt-BR" smtClean="0"/>
-              <a:t>21/08/2021</a:t>
+              <a:t>22/08/2021</a:t>
             </a:fld>
             <a:endParaRPr lang="pt-BR"/>
           </a:p>
@@ -2565,7 +2574,7 @@
           <a:p>
             <a:fld id="{A14DA654-4032-48DC-B1A3-5B71DA7F5F6B}" type="datetimeFigureOut">
               <a:rPr lang="pt-BR" smtClean="0"/>
-              <a:t>21/08/2021</a:t>
+              <a:t>22/08/2021</a:t>
             </a:fld>
             <a:endParaRPr lang="pt-BR"/>
           </a:p>
@@ -7001,8 +7010,8 @@
         </p:nvSpPr>
         <p:spPr>
           <a:xfrm>
-            <a:off x="146051" y="4775478"/>
-            <a:ext cx="1489075" cy="1025150"/>
+            <a:off x="426718" y="5390435"/>
+            <a:ext cx="5972811" cy="264493"/>
           </a:xfrm>
           <a:prstGeom prst="rect">
             <a:avLst/>
@@ -7073,8 +7082,8 @@
         </p:nvSpPr>
         <p:spPr>
           <a:xfrm>
-            <a:off x="146050" y="5859838"/>
-            <a:ext cx="1489075" cy="1025150"/>
+            <a:off x="426718" y="5791521"/>
+            <a:ext cx="5972811" cy="478769"/>
           </a:xfrm>
           <a:prstGeom prst="rect">
             <a:avLst/>
@@ -7155,8 +7164,8 @@
         </p:nvSpPr>
         <p:spPr>
           <a:xfrm>
-            <a:off x="146050" y="6978705"/>
-            <a:ext cx="1489075" cy="1025150"/>
+            <a:off x="426717" y="6399849"/>
+            <a:ext cx="5972811" cy="478769"/>
           </a:xfrm>
           <a:prstGeom prst="rect">
             <a:avLst/>
@@ -7229,8 +7238,8 @@
         </p:nvSpPr>
         <p:spPr>
           <a:xfrm>
-            <a:off x="146050" y="8134363"/>
-            <a:ext cx="1489075" cy="1025150"/>
+            <a:off x="426716" y="7016337"/>
+            <a:ext cx="5972811" cy="478769"/>
           </a:xfrm>
           <a:prstGeom prst="rect">
             <a:avLst/>
@@ -7311,8 +7320,8 @@
         </p:nvSpPr>
         <p:spPr>
           <a:xfrm>
-            <a:off x="1806575" y="8134363"/>
-            <a:ext cx="1489075" cy="1025150"/>
+            <a:off x="426715" y="8183056"/>
+            <a:ext cx="5972811" cy="414519"/>
           </a:xfrm>
           <a:prstGeom prst="rect">
             <a:avLst/>
@@ -7531,42 +7540,6 @@
       </p:cxnSp>
       <p:cxnSp>
         <p:nvCxnSpPr>
-          <p:cNvPr id="101" name="Conector de seta reta 100"/>
-          <p:cNvCxnSpPr>
-            <a:stCxn id="104" idx="2"/>
-            <a:endCxn id="111" idx="0"/>
-          </p:cNvCxnSpPr>
-          <p:nvPr/>
-        </p:nvCxnSpPr>
-        <p:spPr>
-          <a:xfrm>
-            <a:off x="890589" y="4610463"/>
-            <a:ext cx="0" cy="165015"/>
-          </a:xfrm>
-          <a:prstGeom prst="straightConnector1">
-            <a:avLst/>
-          </a:prstGeom>
-          <a:ln>
-            <a:tailEnd type="triangle"/>
-          </a:ln>
-        </p:spPr>
-        <p:style>
-          <a:lnRef idx="1">
-            <a:schemeClr val="accent1"/>
-          </a:lnRef>
-          <a:fillRef idx="0">
-            <a:schemeClr val="accent1"/>
-          </a:fillRef>
-          <a:effectRef idx="0">
-            <a:schemeClr val="accent1"/>
-          </a:effectRef>
-          <a:fontRef idx="minor">
-            <a:schemeClr val="tx1"/>
-          </a:fontRef>
-        </p:style>
-      </p:cxnSp>
-      <p:cxnSp>
-        <p:nvCxnSpPr>
           <p:cNvPr id="103" name="Conector de seta reta 102"/>
           <p:cNvCxnSpPr>
             <a:stCxn id="111" idx="2"/>
@@ -7575,9 +7548,9 @@
           <p:nvPr/>
         </p:nvCxnSpPr>
         <p:spPr>
-          <a:xfrm flipH="1">
-            <a:off x="890588" y="5800628"/>
-            <a:ext cx="1" cy="59210"/>
+          <a:xfrm>
+            <a:off x="3413124" y="5654928"/>
+            <a:ext cx="0" cy="136593"/>
           </a:xfrm>
           <a:prstGeom prst="straightConnector1">
             <a:avLst/>
@@ -7611,9 +7584,9 @@
           <p:nvPr/>
         </p:nvCxnSpPr>
         <p:spPr>
-          <a:xfrm>
-            <a:off x="890588" y="6884988"/>
-            <a:ext cx="0" cy="93717"/>
+          <a:xfrm flipH="1">
+            <a:off x="3413123" y="6270290"/>
+            <a:ext cx="1" cy="129559"/>
           </a:xfrm>
           <a:prstGeom prst="straightConnector1">
             <a:avLst/>
@@ -7647,9 +7620,9 @@
           <p:nvPr/>
         </p:nvCxnSpPr>
         <p:spPr>
-          <a:xfrm>
-            <a:off x="890588" y="8003855"/>
-            <a:ext cx="0" cy="130508"/>
+          <a:xfrm flipH="1">
+            <a:off x="3413122" y="6878618"/>
+            <a:ext cx="1" cy="137719"/>
           </a:xfrm>
           <a:prstGeom prst="straightConnector1">
             <a:avLst/>
@@ -7673,42 +7646,6 @@
           </a:fontRef>
         </p:style>
       </p:cxnSp>
-      <p:cxnSp>
-        <p:nvCxnSpPr>
-          <p:cNvPr id="126" name="Conector de seta reta 125"/>
-          <p:cNvCxnSpPr>
-            <a:stCxn id="107" idx="2"/>
-            <a:endCxn id="115" idx="0"/>
-          </p:cNvCxnSpPr>
-          <p:nvPr/>
-        </p:nvCxnSpPr>
-        <p:spPr>
-          <a:xfrm flipH="1">
-            <a:off x="2551113" y="4610462"/>
-            <a:ext cx="11113" cy="3523901"/>
-          </a:xfrm>
-          <a:prstGeom prst="straightConnector1">
-            <a:avLst/>
-          </a:prstGeom>
-          <a:ln>
-            <a:tailEnd type="triangle"/>
-          </a:ln>
-        </p:spPr>
-        <p:style>
-          <a:lnRef idx="1">
-            <a:schemeClr val="accent1"/>
-          </a:lnRef>
-          <a:fillRef idx="0">
-            <a:schemeClr val="accent1"/>
-          </a:fillRef>
-          <a:effectRef idx="0">
-            <a:schemeClr val="accent1"/>
-          </a:effectRef>
-          <a:fontRef idx="minor">
-            <a:schemeClr val="tx1"/>
-          </a:fontRef>
-        </p:style>
-      </p:cxnSp>
       <p:sp>
         <p:nvSpPr>
           <p:cNvPr id="135" name="CaixaDeTexto 134"/>
@@ -7921,133 +7858,13 @@
       </p:sp>
       <p:sp>
         <p:nvSpPr>
-          <p:cNvPr id="145" name="CaixaDeTexto 144"/>
-          <p:cNvSpPr txBox="1"/>
-          <p:nvPr/>
-        </p:nvSpPr>
-        <p:spPr>
-          <a:xfrm>
-            <a:off x="1635125" y="5137844"/>
-            <a:ext cx="1133476" cy="253916"/>
-          </a:xfrm>
-          <a:prstGeom prst="rect">
-            <a:avLst/>
-          </a:prstGeom>
-          <a:noFill/>
-        </p:spPr>
-        <p:txBody>
-          <a:bodyPr wrap="square" rtlCol="0">
-            <a:spAutoFit/>
-          </a:bodyPr>
-          <a:lstStyle/>
-          <a:p>
-            <a:r>
-              <a:rPr lang="pt-BR" sz="1050" dirty="0" smtClean="0"/>
-              <a:t>Escala 1 a 10</a:t>
-            </a:r>
-            <a:endParaRPr lang="pt-BR" sz="1050" dirty="0"/>
-          </a:p>
-        </p:txBody>
-      </p:sp>
-      <p:sp>
-        <p:nvSpPr>
-          <p:cNvPr id="147" name="CaixaDeTexto 146"/>
-          <p:cNvSpPr txBox="1"/>
-          <p:nvPr/>
-        </p:nvSpPr>
-        <p:spPr>
-          <a:xfrm>
-            <a:off x="1614487" y="6241117"/>
-            <a:ext cx="1133476" cy="253916"/>
-          </a:xfrm>
-          <a:prstGeom prst="rect">
-            <a:avLst/>
-          </a:prstGeom>
-          <a:noFill/>
-        </p:spPr>
-        <p:txBody>
-          <a:bodyPr wrap="square" rtlCol="0">
-            <a:spAutoFit/>
-          </a:bodyPr>
-          <a:lstStyle/>
-          <a:p>
-            <a:r>
-              <a:rPr lang="pt-BR" sz="1050" dirty="0" smtClean="0"/>
-              <a:t>Escala 1 a 10</a:t>
-            </a:r>
-            <a:endParaRPr lang="pt-BR" sz="1050" dirty="0"/>
-          </a:p>
-        </p:txBody>
-      </p:sp>
-      <p:sp>
-        <p:nvSpPr>
-          <p:cNvPr id="148" name="CaixaDeTexto 147"/>
-          <p:cNvSpPr txBox="1"/>
-          <p:nvPr/>
-        </p:nvSpPr>
-        <p:spPr>
-          <a:xfrm>
-            <a:off x="1603375" y="7364322"/>
-            <a:ext cx="1133476" cy="253916"/>
-          </a:xfrm>
-          <a:prstGeom prst="rect">
-            <a:avLst/>
-          </a:prstGeom>
-          <a:noFill/>
-        </p:spPr>
-        <p:txBody>
-          <a:bodyPr wrap="square" rtlCol="0">
-            <a:spAutoFit/>
-          </a:bodyPr>
-          <a:lstStyle/>
-          <a:p>
-            <a:r>
-              <a:rPr lang="pt-BR" sz="1050" dirty="0" smtClean="0"/>
-              <a:t>Escala 1 a 10</a:t>
-            </a:r>
-            <a:endParaRPr lang="pt-BR" sz="1050" dirty="0"/>
-          </a:p>
-        </p:txBody>
-      </p:sp>
-      <p:sp>
-        <p:nvSpPr>
-          <p:cNvPr id="149" name="CaixaDeTexto 148"/>
-          <p:cNvSpPr txBox="1"/>
-          <p:nvPr/>
-        </p:nvSpPr>
-        <p:spPr>
-          <a:xfrm>
-            <a:off x="3295650" y="8516193"/>
-            <a:ext cx="1133476" cy="253916"/>
-          </a:xfrm>
-          <a:prstGeom prst="rect">
-            <a:avLst/>
-          </a:prstGeom>
-          <a:noFill/>
-        </p:spPr>
-        <p:txBody>
-          <a:bodyPr wrap="square" rtlCol="0">
-            <a:spAutoFit/>
-          </a:bodyPr>
-          <a:lstStyle/>
-          <a:p>
-            <a:r>
-              <a:rPr lang="pt-BR" sz="1050" dirty="0" smtClean="0"/>
-              <a:t>Escala 1 a 10</a:t>
-            </a:r>
-            <a:endParaRPr lang="pt-BR" sz="1050" dirty="0"/>
-          </a:p>
-        </p:txBody>
-      </p:sp>
-      <p:sp>
-        <p:nvSpPr>
           <p:cNvPr id="150" name="CaixaDeTexto 149"/>
           <p:cNvSpPr txBox="1"/>
           <p:nvPr/>
         </p:nvSpPr>
         <p:spPr>
           <a:xfrm>
-            <a:off x="323849" y="9337218"/>
+            <a:off x="5832788" y="5116042"/>
             <a:ext cx="1133476" cy="253916"/>
           </a:xfrm>
           <a:prstGeom prst="rect">
@@ -8078,14 +7895,14 @@
           <p:nvPr>
             <p:extLst>
               <p:ext uri="{D42A27DB-BD31-4B8C-83A1-F6EECF244321}">
-                <p14:modId xmlns:p14="http://schemas.microsoft.com/office/powerpoint/2010/main" val="1619891141"/>
+                <p14:modId xmlns:p14="http://schemas.microsoft.com/office/powerpoint/2010/main" val="1520005328"/>
               </p:ext>
             </p:extLst>
           </p:nvPr>
         </p:nvGraphicFramePr>
         <p:xfrm>
-          <a:off x="3584573" y="5665938"/>
-          <a:ext cx="2625723" cy="1143000"/>
+          <a:off x="426715" y="8676370"/>
+          <a:ext cx="2593338" cy="1143000"/>
         </p:xfrm>
         <a:graphic>
           <a:graphicData uri="http://schemas.openxmlformats.org/drawingml/2006/table">
@@ -8094,11 +7911,11 @@
                 <a:tableStyleId>{5C22544A-7EE6-4342-B048-85BDC9FD1C3A}</a:tableStyleId>
               </a:tblPr>
               <a:tblGrid>
-                <a:gridCol w="875241"/>
-                <a:gridCol w="875241"/>
-                <a:gridCol w="875241"/>
+                <a:gridCol w="864446"/>
+                <a:gridCol w="864446"/>
+                <a:gridCol w="864446"/>
               </a:tblGrid>
-              <a:tr h="196982">
+              <a:tr h="211955">
                 <a:tc>
                   <a:txBody>
                     <a:bodyPr/>
@@ -8142,7 +7959,7 @@
                   <a:tcPr/>
                 </a:tc>
               </a:tr>
-              <a:tr h="196982">
+              <a:tr h="178700">
                 <a:tc>
                   <a:txBody>
                     <a:bodyPr/>
@@ -8186,7 +8003,7 @@
                   <a:tcPr/>
                 </a:tc>
               </a:tr>
-              <a:tr h="196982">
+              <a:tr h="178700">
                 <a:tc>
                   <a:txBody>
                     <a:bodyPr/>
@@ -8230,7 +8047,7 @@
                   <a:tcPr/>
                 </a:tc>
               </a:tr>
-              <a:tr h="196982">
+              <a:tr h="178700">
                 <a:tc>
                   <a:txBody>
                     <a:bodyPr/>
@@ -8274,7 +8091,7 @@
                   <a:tcPr/>
                 </a:tc>
               </a:tr>
-              <a:tr h="196982">
+              <a:tr h="178700">
                 <a:tc>
                   <a:txBody>
                     <a:bodyPr/>
@@ -8330,7 +8147,7 @@
         </p:nvSpPr>
         <p:spPr>
           <a:xfrm>
-            <a:off x="3185308" y="9478471"/>
+            <a:off x="3255164" y="9479834"/>
             <a:ext cx="315912" cy="228600"/>
           </a:xfrm>
           <a:prstGeom prst="ellipse">
@@ -8370,7 +8187,7 @@
         </p:nvSpPr>
         <p:spPr>
           <a:xfrm>
-            <a:off x="3641724" y="9461966"/>
+            <a:off x="3643787" y="9333371"/>
             <a:ext cx="2111375" cy="261610"/>
           </a:xfrm>
           <a:prstGeom prst="rect">
@@ -8402,9 +8219,9 @@
           <p:nvPr/>
         </p:nvCxnSpPr>
         <p:spPr>
-          <a:xfrm rot="16200000" flipH="1">
-            <a:off x="2787709" y="8922916"/>
-            <a:ext cx="318958" cy="792151"/>
+          <a:xfrm rot="5400000">
+            <a:off x="2971992" y="9038704"/>
+            <a:ext cx="882259" cy="1"/>
           </a:xfrm>
           <a:prstGeom prst="bentConnector3">
             <a:avLst/>
@@ -8428,19 +8245,59 @@
           </a:fontRef>
         </p:style>
       </p:cxnSp>
+      <p:sp>
+        <p:nvSpPr>
+          <p:cNvPr id="78" name="Losango 77"/>
+          <p:cNvSpPr/>
+          <p:nvPr/>
+        </p:nvSpPr>
+        <p:spPr>
+          <a:xfrm>
+            <a:off x="3211512" y="4776900"/>
+            <a:ext cx="403225" cy="294577"/>
+          </a:xfrm>
+          <a:prstGeom prst="diamond">
+            <a:avLst/>
+          </a:prstGeom>
+        </p:spPr>
+        <p:style>
+          <a:lnRef idx="2">
+            <a:schemeClr val="accent1">
+              <a:shade val="50000"/>
+            </a:schemeClr>
+          </a:lnRef>
+          <a:fillRef idx="1">
+            <a:schemeClr val="accent1"/>
+          </a:fillRef>
+          <a:effectRef idx="0">
+            <a:schemeClr val="accent1"/>
+          </a:effectRef>
+          <a:fontRef idx="minor">
+            <a:schemeClr val="lt1"/>
+          </a:fontRef>
+        </p:style>
+        <p:txBody>
+          <a:bodyPr rtlCol="0" anchor="ctr"/>
+          <a:lstStyle/>
+          <a:p>
+            <a:pPr algn="ctr"/>
+            <a:endParaRPr lang="pt-BR"/>
+          </a:p>
+        </p:txBody>
+      </p:sp>
       <p:cxnSp>
         <p:nvCxnSpPr>
-          <p:cNvPr id="154" name="Conector angulado 153"/>
+          <p:cNvPr id="27" name="Conector angulado 26"/>
           <p:cNvCxnSpPr>
-            <a:stCxn id="114" idx="2"/>
-            <a:endCxn id="151" idx="0"/>
+            <a:stCxn id="107" idx="2"/>
+            <a:endCxn id="78" idx="0"/>
           </p:cNvCxnSpPr>
           <p:nvPr/>
         </p:nvCxnSpPr>
         <p:spPr>
           <a:xfrm rot="16200000" flipH="1">
-            <a:off x="1957447" y="8092654"/>
-            <a:ext cx="318958" cy="2452676"/>
+            <a:off x="2904456" y="4268231"/>
+            <a:ext cx="166438" cy="850899"/>
           </a:xfrm>
           <a:prstGeom prst="bentConnector3">
             <a:avLst/>
@@ -8464,6 +8321,518 @@
           </a:fontRef>
         </p:style>
       </p:cxnSp>
+      <p:cxnSp>
+        <p:nvCxnSpPr>
+          <p:cNvPr id="29" name="Conector angulado 28"/>
+          <p:cNvCxnSpPr>
+            <a:stCxn id="108" idx="2"/>
+            <a:endCxn id="78" idx="0"/>
+          </p:cNvCxnSpPr>
+          <p:nvPr/>
+        </p:nvCxnSpPr>
+        <p:spPr>
+          <a:xfrm rot="5400000">
+            <a:off x="3734098" y="4277135"/>
+            <a:ext cx="178792" cy="820738"/>
+          </a:xfrm>
+          <a:prstGeom prst="bentConnector3">
+            <a:avLst/>
+          </a:prstGeom>
+          <a:ln>
+            <a:tailEnd type="triangle"/>
+          </a:ln>
+        </p:spPr>
+        <p:style>
+          <a:lnRef idx="1">
+            <a:schemeClr val="accent1"/>
+          </a:lnRef>
+          <a:fillRef idx="0">
+            <a:schemeClr val="accent1"/>
+          </a:fillRef>
+          <a:effectRef idx="0">
+            <a:schemeClr val="accent1"/>
+          </a:effectRef>
+          <a:fontRef idx="minor">
+            <a:schemeClr val="tx1"/>
+          </a:fontRef>
+        </p:style>
+      </p:cxnSp>
+      <p:cxnSp>
+        <p:nvCxnSpPr>
+          <p:cNvPr id="31" name="Conector angulado 30"/>
+          <p:cNvCxnSpPr>
+            <a:stCxn id="110" idx="2"/>
+            <a:endCxn id="78" idx="0"/>
+          </p:cNvCxnSpPr>
+          <p:nvPr/>
+        </p:nvCxnSpPr>
+        <p:spPr>
+          <a:xfrm rot="5400000">
+            <a:off x="4573555" y="3441779"/>
+            <a:ext cx="174691" cy="2495550"/>
+          </a:xfrm>
+          <a:prstGeom prst="bentConnector3">
+            <a:avLst/>
+          </a:prstGeom>
+          <a:ln>
+            <a:tailEnd type="triangle"/>
+          </a:ln>
+        </p:spPr>
+        <p:style>
+          <a:lnRef idx="1">
+            <a:schemeClr val="accent1"/>
+          </a:lnRef>
+          <a:fillRef idx="0">
+            <a:schemeClr val="accent1"/>
+          </a:fillRef>
+          <a:effectRef idx="0">
+            <a:schemeClr val="accent1"/>
+          </a:effectRef>
+          <a:fontRef idx="minor">
+            <a:schemeClr val="tx1"/>
+          </a:fontRef>
+        </p:style>
+      </p:cxnSp>
+      <p:cxnSp>
+        <p:nvCxnSpPr>
+          <p:cNvPr id="34" name="Conector angulado 33"/>
+          <p:cNvCxnSpPr>
+            <a:stCxn id="104" idx="2"/>
+            <a:endCxn id="78" idx="0"/>
+          </p:cNvCxnSpPr>
+          <p:nvPr/>
+        </p:nvCxnSpPr>
+        <p:spPr>
+          <a:xfrm rot="16200000" flipH="1">
+            <a:off x="2068639" y="3432413"/>
+            <a:ext cx="166437" cy="2522536"/>
+          </a:xfrm>
+          <a:prstGeom prst="bentConnector3">
+            <a:avLst/>
+          </a:prstGeom>
+          <a:ln>
+            <a:tailEnd type="triangle"/>
+          </a:ln>
+        </p:spPr>
+        <p:style>
+          <a:lnRef idx="1">
+            <a:schemeClr val="accent1"/>
+          </a:lnRef>
+          <a:fillRef idx="0">
+            <a:schemeClr val="accent1"/>
+          </a:fillRef>
+          <a:effectRef idx="0">
+            <a:schemeClr val="accent1"/>
+          </a:effectRef>
+          <a:fontRef idx="minor">
+            <a:schemeClr val="tx1"/>
+          </a:fontRef>
+        </p:style>
+      </p:cxnSp>
+      <p:cxnSp>
+        <p:nvCxnSpPr>
+          <p:cNvPr id="36" name="Conector de seta reta 35"/>
+          <p:cNvCxnSpPr>
+            <a:stCxn id="78" idx="2"/>
+            <a:endCxn id="111" idx="0"/>
+          </p:cNvCxnSpPr>
+          <p:nvPr/>
+        </p:nvCxnSpPr>
+        <p:spPr>
+          <a:xfrm flipH="1">
+            <a:off x="3413124" y="5071477"/>
+            <a:ext cx="1" cy="318958"/>
+          </a:xfrm>
+          <a:prstGeom prst="straightConnector1">
+            <a:avLst/>
+          </a:prstGeom>
+          <a:ln>
+            <a:tailEnd type="triangle"/>
+          </a:ln>
+        </p:spPr>
+        <p:style>
+          <a:lnRef idx="1">
+            <a:schemeClr val="accent1"/>
+          </a:lnRef>
+          <a:fillRef idx="0">
+            <a:schemeClr val="accent1"/>
+          </a:fillRef>
+          <a:effectRef idx="0">
+            <a:schemeClr val="accent1"/>
+          </a:effectRef>
+          <a:fontRef idx="minor">
+            <a:schemeClr val="tx1"/>
+          </a:fontRef>
+        </p:style>
+      </p:cxnSp>
+      <p:sp>
+        <p:nvSpPr>
+          <p:cNvPr id="92" name="CaixaDeTexto 91"/>
+          <p:cNvSpPr txBox="1"/>
+          <p:nvPr/>
+        </p:nvSpPr>
+        <p:spPr>
+          <a:xfrm>
+            <a:off x="3614737" y="4808029"/>
+            <a:ext cx="1133476" cy="253916"/>
+          </a:xfrm>
+          <a:prstGeom prst="rect">
+            <a:avLst/>
+          </a:prstGeom>
+          <a:noFill/>
+        </p:spPr>
+        <p:txBody>
+          <a:bodyPr wrap="square" rtlCol="0">
+            <a:spAutoFit/>
+          </a:bodyPr>
+          <a:lstStyle/>
+          <a:p>
+            <a:r>
+              <a:rPr lang="pt-BR" sz="1050" dirty="0" smtClean="0"/>
+              <a:t>A1_1 = 1?</a:t>
+            </a:r>
+            <a:endParaRPr lang="pt-BR" sz="1050" dirty="0"/>
+          </a:p>
+        </p:txBody>
+      </p:sp>
+      <p:sp>
+        <p:nvSpPr>
+          <p:cNvPr id="102" name="CaixaDeTexto 101"/>
+          <p:cNvSpPr txBox="1"/>
+          <p:nvPr/>
+        </p:nvSpPr>
+        <p:spPr>
+          <a:xfrm>
+            <a:off x="3482328" y="5069472"/>
+            <a:ext cx="1133476" cy="253916"/>
+          </a:xfrm>
+          <a:prstGeom prst="rect">
+            <a:avLst/>
+          </a:prstGeom>
+          <a:noFill/>
+        </p:spPr>
+        <p:txBody>
+          <a:bodyPr wrap="square" rtlCol="0">
+            <a:spAutoFit/>
+          </a:bodyPr>
+          <a:lstStyle/>
+          <a:p>
+            <a:r>
+              <a:rPr lang="pt-BR" sz="1050" dirty="0" smtClean="0"/>
+              <a:t>Sim</a:t>
+            </a:r>
+            <a:endParaRPr lang="pt-BR" sz="1050" dirty="0"/>
+          </a:p>
+        </p:txBody>
+      </p:sp>
+      <p:sp>
+        <p:nvSpPr>
+          <p:cNvPr id="109" name="Losango 108"/>
+          <p:cNvSpPr/>
+          <p:nvPr/>
+        </p:nvSpPr>
+        <p:spPr>
+          <a:xfrm>
+            <a:off x="3211512" y="7631699"/>
+            <a:ext cx="403225" cy="294577"/>
+          </a:xfrm>
+          <a:prstGeom prst="diamond">
+            <a:avLst/>
+          </a:prstGeom>
+        </p:spPr>
+        <p:style>
+          <a:lnRef idx="2">
+            <a:schemeClr val="accent1">
+              <a:shade val="50000"/>
+            </a:schemeClr>
+          </a:lnRef>
+          <a:fillRef idx="1">
+            <a:schemeClr val="accent1"/>
+          </a:fillRef>
+          <a:effectRef idx="0">
+            <a:schemeClr val="accent1"/>
+          </a:effectRef>
+          <a:fontRef idx="minor">
+            <a:schemeClr val="lt1"/>
+          </a:fontRef>
+        </p:style>
+        <p:txBody>
+          <a:bodyPr rtlCol="0" anchor="ctr"/>
+          <a:lstStyle/>
+          <a:p>
+            <a:pPr algn="ctr"/>
+            <a:endParaRPr lang="pt-BR"/>
+          </a:p>
+        </p:txBody>
+      </p:sp>
+      <p:sp>
+        <p:nvSpPr>
+          <p:cNvPr id="116" name="CaixaDeTexto 115"/>
+          <p:cNvSpPr txBox="1"/>
+          <p:nvPr/>
+        </p:nvSpPr>
+        <p:spPr>
+          <a:xfrm>
+            <a:off x="3643787" y="7717734"/>
+            <a:ext cx="1133476" cy="253916"/>
+          </a:xfrm>
+          <a:prstGeom prst="rect">
+            <a:avLst/>
+          </a:prstGeom>
+          <a:noFill/>
+        </p:spPr>
+        <p:txBody>
+          <a:bodyPr wrap="square" rtlCol="0">
+            <a:spAutoFit/>
+          </a:bodyPr>
+          <a:lstStyle/>
+          <a:p>
+            <a:r>
+              <a:rPr lang="pt-BR" sz="1050" dirty="0" smtClean="0"/>
+              <a:t>A1_2 = 2?</a:t>
+            </a:r>
+            <a:endParaRPr lang="pt-BR" sz="1050" dirty="0"/>
+          </a:p>
+        </p:txBody>
+      </p:sp>
+      <p:cxnSp>
+        <p:nvCxnSpPr>
+          <p:cNvPr id="59" name="Conector de seta reta 58"/>
+          <p:cNvCxnSpPr>
+            <a:stCxn id="109" idx="2"/>
+            <a:endCxn id="115" idx="0"/>
+          </p:cNvCxnSpPr>
+          <p:nvPr/>
+        </p:nvCxnSpPr>
+        <p:spPr>
+          <a:xfrm flipH="1">
+            <a:off x="3413121" y="7926276"/>
+            <a:ext cx="4" cy="256780"/>
+          </a:xfrm>
+          <a:prstGeom prst="straightConnector1">
+            <a:avLst/>
+          </a:prstGeom>
+          <a:ln>
+            <a:tailEnd type="triangle"/>
+          </a:ln>
+        </p:spPr>
+        <p:style>
+          <a:lnRef idx="1">
+            <a:schemeClr val="accent1"/>
+          </a:lnRef>
+          <a:fillRef idx="0">
+            <a:schemeClr val="accent1"/>
+          </a:fillRef>
+          <a:effectRef idx="0">
+            <a:schemeClr val="accent1"/>
+          </a:effectRef>
+          <a:fontRef idx="minor">
+            <a:schemeClr val="tx1"/>
+          </a:fontRef>
+        </p:style>
+      </p:cxnSp>
+      <p:sp>
+        <p:nvSpPr>
+          <p:cNvPr id="117" name="CaixaDeTexto 116"/>
+          <p:cNvSpPr txBox="1"/>
+          <p:nvPr/>
+        </p:nvSpPr>
+        <p:spPr>
+          <a:xfrm>
+            <a:off x="3432651" y="7932718"/>
+            <a:ext cx="1133476" cy="253916"/>
+          </a:xfrm>
+          <a:prstGeom prst="rect">
+            <a:avLst/>
+          </a:prstGeom>
+          <a:noFill/>
+        </p:spPr>
+        <p:txBody>
+          <a:bodyPr wrap="square" rtlCol="0">
+            <a:spAutoFit/>
+          </a:bodyPr>
+          <a:lstStyle/>
+          <a:p>
+            <a:r>
+              <a:rPr lang="pt-BR" sz="1050" dirty="0" smtClean="0"/>
+              <a:t>Sim</a:t>
+            </a:r>
+            <a:endParaRPr lang="pt-BR" sz="1050" dirty="0"/>
+          </a:p>
+        </p:txBody>
+      </p:sp>
+      <p:cxnSp>
+        <p:nvCxnSpPr>
+          <p:cNvPr id="63" name="Conector angulado 62"/>
+          <p:cNvCxnSpPr>
+            <a:stCxn id="78" idx="1"/>
+            <a:endCxn id="109" idx="1"/>
+          </p:cNvCxnSpPr>
+          <p:nvPr/>
+        </p:nvCxnSpPr>
+        <p:spPr>
+          <a:xfrm rot="10800000" flipV="1">
+            <a:off x="3211512" y="4924188"/>
+            <a:ext cx="12700" cy="2854799"/>
+          </a:xfrm>
+          <a:prstGeom prst="bentConnector3">
+            <a:avLst>
+              <a:gd name="adj1" fmla="val 23460000"/>
+            </a:avLst>
+          </a:prstGeom>
+          <a:ln>
+            <a:tailEnd type="triangle"/>
+          </a:ln>
+        </p:spPr>
+        <p:style>
+          <a:lnRef idx="1">
+            <a:schemeClr val="accent1"/>
+          </a:lnRef>
+          <a:fillRef idx="0">
+            <a:schemeClr val="accent1"/>
+          </a:fillRef>
+          <a:effectRef idx="0">
+            <a:schemeClr val="accent1"/>
+          </a:effectRef>
+          <a:fontRef idx="minor">
+            <a:schemeClr val="tx1"/>
+          </a:fontRef>
+        </p:style>
+      </p:cxnSp>
+      <p:cxnSp>
+        <p:nvCxnSpPr>
+          <p:cNvPr id="72" name="Conector de seta reta 71"/>
+          <p:cNvCxnSpPr>
+            <a:stCxn id="114" idx="2"/>
+            <a:endCxn id="109" idx="0"/>
+          </p:cNvCxnSpPr>
+          <p:nvPr/>
+        </p:nvCxnSpPr>
+        <p:spPr>
+          <a:xfrm>
+            <a:off x="3413122" y="7495106"/>
+            <a:ext cx="3" cy="136593"/>
+          </a:xfrm>
+          <a:prstGeom prst="straightConnector1">
+            <a:avLst/>
+          </a:prstGeom>
+          <a:ln>
+            <a:tailEnd type="triangle"/>
+          </a:ln>
+        </p:spPr>
+        <p:style>
+          <a:lnRef idx="1">
+            <a:schemeClr val="accent1"/>
+          </a:lnRef>
+          <a:fillRef idx="0">
+            <a:schemeClr val="accent1"/>
+          </a:fillRef>
+          <a:effectRef idx="0">
+            <a:schemeClr val="accent1"/>
+          </a:effectRef>
+          <a:fontRef idx="minor">
+            <a:schemeClr val="tx1"/>
+          </a:fontRef>
+        </p:style>
+      </p:cxnSp>
+      <p:sp>
+        <p:nvSpPr>
+          <p:cNvPr id="131" name="CaixaDeTexto 130"/>
+          <p:cNvSpPr txBox="1"/>
+          <p:nvPr/>
+        </p:nvSpPr>
+        <p:spPr>
+          <a:xfrm>
+            <a:off x="2397124" y="4924094"/>
+            <a:ext cx="1133476" cy="253916"/>
+          </a:xfrm>
+          <a:prstGeom prst="rect">
+            <a:avLst/>
+          </a:prstGeom>
+          <a:noFill/>
+        </p:spPr>
+        <p:txBody>
+          <a:bodyPr wrap="square" rtlCol="0">
+            <a:spAutoFit/>
+          </a:bodyPr>
+          <a:lstStyle/>
+          <a:p>
+            <a:r>
+              <a:rPr lang="pt-BR" sz="1050" dirty="0" smtClean="0"/>
+              <a:t>Não</a:t>
+            </a:r>
+            <a:endParaRPr lang="pt-BR" sz="1050" dirty="0"/>
+          </a:p>
+        </p:txBody>
+      </p:sp>
+      <p:cxnSp>
+        <p:nvCxnSpPr>
+          <p:cNvPr id="89" name="Conector angulado 88"/>
+          <p:cNvCxnSpPr>
+            <a:stCxn id="109" idx="3"/>
+            <a:endCxn id="151" idx="6"/>
+          </p:cNvCxnSpPr>
+          <p:nvPr/>
+        </p:nvCxnSpPr>
+        <p:spPr>
+          <a:xfrm flipH="1">
+            <a:off x="3571076" y="7778988"/>
+            <a:ext cx="43661" cy="1815146"/>
+          </a:xfrm>
+          <a:prstGeom prst="bentConnector3">
+            <a:avLst>
+              <a:gd name="adj1" fmla="val -6579648"/>
+            </a:avLst>
+          </a:prstGeom>
+          <a:ln>
+            <a:tailEnd type="triangle"/>
+          </a:ln>
+        </p:spPr>
+        <p:style>
+          <a:lnRef idx="1">
+            <a:schemeClr val="accent1"/>
+          </a:lnRef>
+          <a:fillRef idx="0">
+            <a:schemeClr val="accent1"/>
+          </a:fillRef>
+          <a:effectRef idx="0">
+            <a:schemeClr val="accent1"/>
+          </a:effectRef>
+          <a:fontRef idx="minor">
+            <a:schemeClr val="tx1"/>
+          </a:fontRef>
+        </p:style>
+      </p:cxnSp>
+      <p:sp>
+        <p:nvSpPr>
+          <p:cNvPr id="134" name="CaixaDeTexto 133"/>
+          <p:cNvSpPr txBox="1"/>
+          <p:nvPr/>
+        </p:nvSpPr>
+        <p:spPr>
+          <a:xfrm>
+            <a:off x="5404475" y="7932718"/>
+            <a:ext cx="1133476" cy="253916"/>
+          </a:xfrm>
+          <a:prstGeom prst="rect">
+            <a:avLst/>
+          </a:prstGeom>
+          <a:noFill/>
+        </p:spPr>
+        <p:txBody>
+          <a:bodyPr wrap="square" rtlCol="0">
+            <a:spAutoFit/>
+          </a:bodyPr>
+          <a:lstStyle/>
+          <a:p>
+            <a:r>
+              <a:rPr lang="pt-BR" sz="1050" dirty="0" smtClean="0"/>
+              <a:t>Escala 1 a 10</a:t>
+            </a:r>
+            <a:endParaRPr lang="pt-BR" sz="1050" dirty="0"/>
+          </a:p>
+        </p:txBody>
+      </p:sp>
     </p:spTree>
     <p:extLst>
       <p:ext uri="{BB962C8B-B14F-4D97-AF65-F5344CB8AC3E}">
@@ -13126,7 +13495,7 @@
         <p:spPr>
           <a:xfrm>
             <a:off x="784860" y="533400"/>
-            <a:ext cx="5379720" cy="2631490"/>
+            <a:ext cx="5379720" cy="2462213"/>
           </a:xfrm>
           <a:prstGeom prst="rect">
             <a:avLst/>
@@ -13145,7 +13514,7 @@
             </a:pPr>
             <a:r>
               <a:rPr lang="pt-BR" sz="1100" dirty="0" smtClean="0"/>
-              <a:t>Ramificação 1: Área de Trabalho | 2015 à 2019</a:t>
+              <a:t>Caminho 1:</a:t>
             </a:r>
           </a:p>
           <a:p>
@@ -13155,7 +13524,7 @@
             </a:pPr>
             <a:r>
               <a:rPr lang="pt-BR" sz="1100" dirty="0" smtClean="0"/>
-              <a:t>Total: 122853 </a:t>
+              <a:t>Anos 2015 a 2018, devido a pergunta G1 “Se existe concorrente na vizinhança”, pois as perguntas destinadas a isso eram apenas para 2019 para frente. Além disso, a pergunta sobre a área de trabalho do entrevistado muda a partir de 2020, e assim limita a quantidade de respostas. </a:t>
             </a:r>
           </a:p>
           <a:p>
@@ -13165,7 +13534,27 @@
             </a:pPr>
             <a:r>
               <a:rPr lang="pt-BR" sz="1100" dirty="0" smtClean="0"/>
-              <a:t>Eliminação das Colunas Q2_1 e Q2_2 pois essas se referem a apenas o ano de 2020</a:t>
+              <a:t>Considera apenas Questionamentos de Sim ou Não, sem a avaliação do atributo em caso de Sim. Por exemplo, considera apenas. </a:t>
+            </a:r>
+            <a:r>
+              <a:rPr lang="pt-BR" sz="1100" dirty="0"/>
+              <a:t>o </a:t>
+            </a:r>
+            <a:r>
+              <a:rPr lang="pt-BR" sz="1100" u="sng" dirty="0"/>
+              <a:t>E3 (TIPO 1): Descreve se o usuário entrou em contato com a prestadora citada para alterar o plano ou alguma condição comercial nos 6 meses anteriores à pesquisa</a:t>
+            </a:r>
+            <a:r>
+              <a:rPr lang="pt-BR" sz="1100" u="sng" dirty="0" smtClean="0"/>
+              <a:t> , </a:t>
+            </a:r>
+            <a:r>
+              <a:rPr lang="pt-BR" sz="1100" dirty="0"/>
+              <a:t> </a:t>
+            </a:r>
+            <a:r>
+              <a:rPr lang="pt-BR" sz="1100" dirty="0" smtClean="0"/>
+              <a:t>e o atributo E4 que questiona a avaliação do atendimento da prestadora não é considerado. </a:t>
             </a:r>
           </a:p>
           <a:p>
@@ -13173,85 +13562,588 @@
               <a:buFont typeface="Arial" panose="020B0604020202020204" pitchFamily="34" charset="0"/>
               <a:buChar char="•"/>
             </a:pPr>
+            <a:r>
+              <a:rPr lang="pt-BR" sz="1100" dirty="0" smtClean="0"/>
+              <a:t>Remoção de outros atributos sem relevância ou com perguntas repetidas, como CÓD_IBGE, Peso, H2a, Q7a, entre outros. </a:t>
+            </a:r>
             <a:endParaRPr lang="pt-BR" sz="1100" dirty="0"/>
           </a:p>
           <a:p>
-            <a:pPr marL="182563" lvl="1" indent="-171450">
-              <a:buFont typeface="Arial" panose="020B0604020202020204" pitchFamily="34" charset="0"/>
-              <a:buChar char="•"/>
-            </a:pPr>
-            <a:r>
-              <a:rPr lang="pt-BR" sz="1100" dirty="0" smtClean="0"/>
-              <a:t>Ramificação 2: Atendimento Telefônico | Apenas Clientes que realizaram o atendimento e sua satisfação. </a:t>
-            </a:r>
-          </a:p>
-          <a:p>
-            <a:pPr marL="639763" lvl="2" indent="-171450">
-              <a:buFont typeface="Arial" panose="020B0604020202020204" pitchFamily="34" charset="0"/>
-              <a:buChar char="•"/>
-            </a:pPr>
-            <a:r>
-              <a:rPr lang="pt-BR" sz="1100" dirty="0" smtClean="0"/>
-              <a:t>Total Sem filtrar os anos 114685</a:t>
-            </a:r>
-          </a:p>
-          <a:p>
-            <a:pPr marL="639763" lvl="2" indent="-171450">
-              <a:buFont typeface="Arial" panose="020B0604020202020204" pitchFamily="34" charset="0"/>
-              <a:buChar char="•"/>
-            </a:pPr>
-            <a:r>
-              <a:rPr lang="pt-BR" sz="1100" dirty="0" smtClean="0"/>
-              <a:t>Eliminar Colunas A1_2, A1_3, A1_4 e A4;</a:t>
-            </a:r>
-          </a:p>
-          <a:p>
-            <a:pPr marL="639763" lvl="2" indent="-171450">
-              <a:buFont typeface="Arial" panose="020B0604020202020204" pitchFamily="34" charset="0"/>
-              <a:buChar char="•"/>
-            </a:pPr>
-            <a:r>
-              <a:rPr lang="pt-BR" sz="1100" dirty="0" smtClean="0"/>
-              <a:t>Preencher vazios em A1_1 com equivalente numérico para 2; </a:t>
-            </a:r>
-          </a:p>
-          <a:p>
-            <a:pPr marL="182563" lvl="2" indent="-171450">
-              <a:buFont typeface="Arial" panose="020B0604020202020204" pitchFamily="34" charset="0"/>
-              <a:buChar char="•"/>
-            </a:pPr>
-            <a:r>
-              <a:rPr lang="pt-BR" sz="1100" dirty="0" smtClean="0"/>
-              <a:t>Ramificaç</a:t>
-            </a:r>
-            <a:r>
-              <a:rPr lang="pt-BR" sz="1100" dirty="0" smtClean="0"/>
-              <a:t>ões 3: Solicitação de Reparos, Cancelamento e Instalação | Para todas eliminara a satisfação, pois existem muitas colunas vazias e considerar o NÃO das perguntas anteriores. </a:t>
-            </a:r>
-          </a:p>
-          <a:p>
-            <a:pPr marL="182563" lvl="2" indent="-171450">
-              <a:buFont typeface="Arial" panose="020B0604020202020204" pitchFamily="34" charset="0"/>
-              <a:buChar char="•"/>
-            </a:pPr>
-            <a:r>
-              <a:rPr lang="pt-BR" sz="1100" dirty="0" smtClean="0"/>
-              <a:t>Ramificação 4: Considerar apenas G1, e os anos passam a apenas 2015 a 2018. </a:t>
-            </a:r>
-          </a:p>
-          <a:p>
-            <a:pPr marL="639763" lvl="2" indent="-171450">
+            <a:pPr marL="628650" lvl="1" indent="-171450">
               <a:buFont typeface="Arial" panose="020B0604020202020204" pitchFamily="34" charset="0"/>
               <a:buChar char="•"/>
             </a:pPr>
             <a:endParaRPr lang="pt-BR" sz="1100" dirty="0" smtClean="0"/>
           </a:p>
-        </p:txBody>
-      </p:sp>
+          <a:p>
+            <a:pPr marL="628650" lvl="1" indent="-171450">
+              <a:buFont typeface="Arial" panose="020B0604020202020204" pitchFamily="34" charset="0"/>
+              <a:buChar char="•"/>
+            </a:pPr>
+            <a:endParaRPr lang="pt-BR" sz="1100" dirty="0" smtClean="0"/>
+          </a:p>
+        </p:txBody>
+      </p:sp>
+      <p:pic>
+        <p:nvPicPr>
+          <p:cNvPr id="2" name="Imagem 1"/>
+          <p:cNvPicPr>
+            <a:picLocks noChangeAspect="1"/>
+          </p:cNvPicPr>
+          <p:nvPr/>
+        </p:nvPicPr>
+        <p:blipFill>
+          <a:blip r:embed="rId2" cstate="print">
+            <a:extLst>
+              <a:ext uri="{28A0092B-C50C-407E-A947-70E740481C1C}">
+                <a14:useLocalDpi xmlns:a14="http://schemas.microsoft.com/office/drawing/2010/main" val="0"/>
+              </a:ext>
+            </a:extLst>
+          </a:blip>
+          <a:stretch>
+            <a:fillRect/>
+          </a:stretch>
+        </p:blipFill>
+        <p:spPr>
+          <a:xfrm>
+            <a:off x="128832" y="2850515"/>
+            <a:ext cx="6691775" cy="7055485"/>
+          </a:xfrm>
+          <a:prstGeom prst="rect">
+            <a:avLst/>
+          </a:prstGeom>
+        </p:spPr>
+      </p:pic>
     </p:spTree>
     <p:extLst>
       <p:ext uri="{BB962C8B-B14F-4D97-AF65-F5344CB8AC3E}">
         <p14:creationId xmlns:p14="http://schemas.microsoft.com/office/powerpoint/2010/main" val="2351945423"/>
+      </p:ext>
+    </p:extLst>
+  </p:cSld>
+  <p:clrMapOvr>
+    <a:masterClrMapping/>
+  </p:clrMapOvr>
+</p:sld>
+</file>
+
+<file path=ppt/slides/slide6.xml><?xml version="1.0" encoding="utf-8"?>
+<p:sld xmlns:a="http://schemas.openxmlformats.org/drawingml/2006/main" xmlns:r="http://schemas.openxmlformats.org/officeDocument/2006/relationships" xmlns:p="http://schemas.openxmlformats.org/presentationml/2006/main">
+  <p:cSld>
+    <p:spTree>
+      <p:nvGrpSpPr>
+        <p:cNvPr id="1" name=""/>
+        <p:cNvGrpSpPr/>
+        <p:nvPr/>
+      </p:nvGrpSpPr>
+      <p:grpSpPr>
+        <a:xfrm>
+          <a:off x="0" y="0"/>
+          <a:ext cx="0" cy="0"/>
+          <a:chOff x="0" y="0"/>
+          <a:chExt cx="0" cy="0"/>
+        </a:xfrm>
+      </p:grpSpPr>
+      <p:sp>
+        <p:nvSpPr>
+          <p:cNvPr id="4" name="CaixaDeTexto 3"/>
+          <p:cNvSpPr txBox="1"/>
+          <p:nvPr/>
+        </p:nvSpPr>
+        <p:spPr>
+          <a:xfrm>
+            <a:off x="784860" y="533400"/>
+            <a:ext cx="5379720" cy="1954381"/>
+          </a:xfrm>
+          <a:prstGeom prst="rect">
+            <a:avLst/>
+          </a:prstGeom>
+          <a:noFill/>
+        </p:spPr>
+        <p:txBody>
+          <a:bodyPr wrap="square" rtlCol="0">
+            <a:spAutoFit/>
+          </a:bodyPr>
+          <a:lstStyle/>
+          <a:p>
+            <a:pPr marL="171450" indent="-171450">
+              <a:buFont typeface="Arial" panose="020B0604020202020204" pitchFamily="34" charset="0"/>
+              <a:buChar char="•"/>
+            </a:pPr>
+            <a:r>
+              <a:rPr lang="pt-BR" sz="1100" dirty="0" smtClean="0"/>
+              <a:t>Caminho 2:</a:t>
+            </a:r>
+          </a:p>
+          <a:p>
+            <a:pPr marL="628650" lvl="1" indent="-171450">
+              <a:buFont typeface="Arial" panose="020B0604020202020204" pitchFamily="34" charset="0"/>
+              <a:buChar char="•"/>
+            </a:pPr>
+            <a:r>
+              <a:rPr lang="pt-BR" sz="1100" dirty="0" smtClean="0"/>
+              <a:t>Ano 2020</a:t>
+            </a:r>
+          </a:p>
+          <a:p>
+            <a:pPr marL="628650" lvl="1" indent="-171450">
+              <a:buFont typeface="Arial" panose="020B0604020202020204" pitchFamily="34" charset="0"/>
+              <a:buChar char="•"/>
+            </a:pPr>
+            <a:r>
+              <a:rPr lang="pt-BR" sz="1100" dirty="0" smtClean="0"/>
+              <a:t>Considera apenas Questionamentos de Sim ou Não, sem a avaliação do atributo em caso de Sim. Por exemplo, considera apenas. </a:t>
+            </a:r>
+            <a:r>
+              <a:rPr lang="pt-BR" sz="1100" dirty="0"/>
+              <a:t>o </a:t>
+            </a:r>
+            <a:r>
+              <a:rPr lang="pt-BR" sz="1100" u="sng" dirty="0"/>
+              <a:t>E3 (TIPO 1): Descreve se o usuário entrou em contato com a prestadora citada para alterar o plano ou alguma condição comercial nos 6 meses anteriores à pesquisa</a:t>
+            </a:r>
+            <a:r>
+              <a:rPr lang="pt-BR" sz="1100" u="sng" dirty="0" smtClean="0"/>
+              <a:t> , </a:t>
+            </a:r>
+            <a:r>
+              <a:rPr lang="pt-BR" sz="1100" dirty="0"/>
+              <a:t> </a:t>
+            </a:r>
+            <a:r>
+              <a:rPr lang="pt-BR" sz="1100" dirty="0" smtClean="0"/>
+              <a:t>e o atributo E4 que questiona a avaliação do atendimento da prestadora não é considerado. </a:t>
+            </a:r>
+          </a:p>
+          <a:p>
+            <a:pPr marL="628650" lvl="1" indent="-171450">
+              <a:buFont typeface="Arial" panose="020B0604020202020204" pitchFamily="34" charset="0"/>
+              <a:buChar char="•"/>
+            </a:pPr>
+            <a:r>
+              <a:rPr lang="pt-BR" sz="1100" dirty="0" smtClean="0"/>
+              <a:t>Remoção de outros atributos sem relevância ou com perguntas repetidas, como CÓD_IBGE, Peso, H2a, Q7a, entre outros. </a:t>
+            </a:r>
+            <a:endParaRPr lang="pt-BR" sz="1100" dirty="0"/>
+          </a:p>
+          <a:p>
+            <a:pPr marL="628650" lvl="1" indent="-171450">
+              <a:buFont typeface="Arial" panose="020B0604020202020204" pitchFamily="34" charset="0"/>
+              <a:buChar char="•"/>
+            </a:pPr>
+            <a:endParaRPr lang="pt-BR" sz="1100" dirty="0" smtClean="0"/>
+          </a:p>
+          <a:p>
+            <a:pPr marL="628650" lvl="1" indent="-171450">
+              <a:buFont typeface="Arial" panose="020B0604020202020204" pitchFamily="34" charset="0"/>
+              <a:buChar char="•"/>
+            </a:pPr>
+            <a:endParaRPr lang="pt-BR" sz="1100" dirty="0" smtClean="0"/>
+          </a:p>
+        </p:txBody>
+      </p:sp>
+      <p:pic>
+        <p:nvPicPr>
+          <p:cNvPr id="3" name="Imagem 2"/>
+          <p:cNvPicPr>
+            <a:picLocks noChangeAspect="1"/>
+          </p:cNvPicPr>
+          <p:nvPr/>
+        </p:nvPicPr>
+        <p:blipFill>
+          <a:blip r:embed="rId2" cstate="print">
+            <a:extLst>
+              <a:ext uri="{28A0092B-C50C-407E-A947-70E740481C1C}">
+                <a14:useLocalDpi xmlns:a14="http://schemas.microsoft.com/office/drawing/2010/main" val="0"/>
+              </a:ext>
+            </a:extLst>
+          </a:blip>
+          <a:stretch>
+            <a:fillRect/>
+          </a:stretch>
+        </p:blipFill>
+        <p:spPr>
+          <a:xfrm>
+            <a:off x="45720" y="2759075"/>
+            <a:ext cx="6858000" cy="7230745"/>
+          </a:xfrm>
+          <a:prstGeom prst="rect">
+            <a:avLst/>
+          </a:prstGeom>
+        </p:spPr>
+      </p:pic>
+    </p:spTree>
+    <p:extLst>
+      <p:ext uri="{BB962C8B-B14F-4D97-AF65-F5344CB8AC3E}">
+        <p14:creationId xmlns:p14="http://schemas.microsoft.com/office/powerpoint/2010/main" val="1224521833"/>
+      </p:ext>
+    </p:extLst>
+  </p:cSld>
+  <p:clrMapOvr>
+    <a:masterClrMapping/>
+  </p:clrMapOvr>
+</p:sld>
+</file>
+
+<file path=ppt/slides/slide7.xml><?xml version="1.0" encoding="utf-8"?>
+<p:sld xmlns:a="http://schemas.openxmlformats.org/drawingml/2006/main" xmlns:r="http://schemas.openxmlformats.org/officeDocument/2006/relationships" xmlns:p="http://schemas.openxmlformats.org/presentationml/2006/main">
+  <p:cSld>
+    <p:spTree>
+      <p:nvGrpSpPr>
+        <p:cNvPr id="1" name=""/>
+        <p:cNvGrpSpPr/>
+        <p:nvPr/>
+      </p:nvGrpSpPr>
+      <p:grpSpPr>
+        <a:xfrm>
+          <a:off x="0" y="0"/>
+          <a:ext cx="0" cy="0"/>
+          <a:chOff x="0" y="0"/>
+          <a:chExt cx="0" cy="0"/>
+        </a:xfrm>
+      </p:grpSpPr>
+      <p:sp>
+        <p:nvSpPr>
+          <p:cNvPr id="4" name="CaixaDeTexto 3"/>
+          <p:cNvSpPr txBox="1"/>
+          <p:nvPr/>
+        </p:nvSpPr>
+        <p:spPr>
+          <a:xfrm>
+            <a:off x="784860" y="533400"/>
+            <a:ext cx="5379720" cy="2123658"/>
+          </a:xfrm>
+          <a:prstGeom prst="rect">
+            <a:avLst/>
+          </a:prstGeom>
+          <a:noFill/>
+        </p:spPr>
+        <p:txBody>
+          <a:bodyPr wrap="square" rtlCol="0">
+            <a:spAutoFit/>
+          </a:bodyPr>
+          <a:lstStyle/>
+          <a:p>
+            <a:pPr marL="171450" indent="-171450">
+              <a:buFont typeface="Arial" panose="020B0604020202020204" pitchFamily="34" charset="0"/>
+              <a:buChar char="•"/>
+            </a:pPr>
+            <a:r>
+              <a:rPr lang="pt-BR" sz="1100" dirty="0" smtClean="0"/>
+              <a:t>Caminho 3:</a:t>
+            </a:r>
+          </a:p>
+          <a:p>
+            <a:pPr marL="628650" lvl="1" indent="-171450">
+              <a:buFont typeface="Arial" panose="020B0604020202020204" pitchFamily="34" charset="0"/>
+              <a:buChar char="•"/>
+            </a:pPr>
+            <a:r>
+              <a:rPr lang="pt-BR" sz="1100" dirty="0" smtClean="0"/>
+              <a:t>Ano 2020</a:t>
+            </a:r>
+          </a:p>
+          <a:p>
+            <a:pPr marL="628650" lvl="1" indent="-171450">
+              <a:buFont typeface="Arial" panose="020B0604020202020204" pitchFamily="34" charset="0"/>
+              <a:buChar char="•"/>
+            </a:pPr>
+            <a:r>
+              <a:rPr lang="pt-BR" sz="1100" dirty="0" smtClean="0"/>
+              <a:t>E1 == 1 e E3 == 1 (São os atributos com maiores correlações com E5 de cancelamento)</a:t>
+            </a:r>
+          </a:p>
+          <a:p>
+            <a:pPr marL="628650" lvl="1" indent="-171450">
+              <a:buFont typeface="Arial" panose="020B0604020202020204" pitchFamily="34" charset="0"/>
+              <a:buChar char="•"/>
+            </a:pPr>
+            <a:r>
+              <a:rPr lang="pt-BR" sz="1100" dirty="0" smtClean="0"/>
+              <a:t>Com E1 e E3 igual 1, considera o E2 e E4 pois são os atributos de avaliação de 1 a 10 do E1 e E3. </a:t>
+            </a:r>
+            <a:endParaRPr lang="pt-BR" sz="1100" dirty="0" smtClean="0"/>
+          </a:p>
+          <a:p>
+            <a:pPr marL="628650" lvl="1" indent="-171450">
+              <a:buFont typeface="Arial" panose="020B0604020202020204" pitchFamily="34" charset="0"/>
+              <a:buChar char="•"/>
+            </a:pPr>
+            <a:r>
+              <a:rPr lang="pt-BR" sz="1100" dirty="0" smtClean="0"/>
+              <a:t>Para os demais, considera apenas Questionamentos de Sim ou Não, sem a avaliação do atributo em caso de Sim. </a:t>
+            </a:r>
+          </a:p>
+          <a:p>
+            <a:pPr marL="628650" lvl="1" indent="-171450">
+              <a:buFont typeface="Arial" panose="020B0604020202020204" pitchFamily="34" charset="0"/>
+              <a:buChar char="•"/>
+            </a:pPr>
+            <a:r>
+              <a:rPr lang="pt-BR" sz="1100" dirty="0" smtClean="0"/>
+              <a:t>Remoção de outros atributos sem relevância ou com perguntas repetidas, como CÓD_IBGE, Peso, H2a, Q7a, entre outros. </a:t>
+            </a:r>
+            <a:endParaRPr lang="pt-BR" sz="1100" dirty="0"/>
+          </a:p>
+          <a:p>
+            <a:pPr marL="628650" lvl="1" indent="-171450">
+              <a:buFont typeface="Arial" panose="020B0604020202020204" pitchFamily="34" charset="0"/>
+              <a:buChar char="•"/>
+            </a:pPr>
+            <a:endParaRPr lang="pt-BR" sz="1100" dirty="0" smtClean="0"/>
+          </a:p>
+          <a:p>
+            <a:pPr marL="628650" lvl="1" indent="-171450">
+              <a:buFont typeface="Arial" panose="020B0604020202020204" pitchFamily="34" charset="0"/>
+              <a:buChar char="•"/>
+            </a:pPr>
+            <a:endParaRPr lang="pt-BR" sz="1100" dirty="0" smtClean="0"/>
+          </a:p>
+        </p:txBody>
+      </p:sp>
+      <p:pic>
+        <p:nvPicPr>
+          <p:cNvPr id="2" name="Imagem 1"/>
+          <p:cNvPicPr>
+            <a:picLocks noChangeAspect="1"/>
+          </p:cNvPicPr>
+          <p:nvPr/>
+        </p:nvPicPr>
+        <p:blipFill>
+          <a:blip r:embed="rId2" cstate="print">
+            <a:extLst>
+              <a:ext uri="{28A0092B-C50C-407E-A947-70E740481C1C}">
+                <a14:useLocalDpi xmlns:a14="http://schemas.microsoft.com/office/drawing/2010/main" val="0"/>
+              </a:ext>
+            </a:extLst>
+          </a:blip>
+          <a:stretch>
+            <a:fillRect/>
+          </a:stretch>
+        </p:blipFill>
+        <p:spPr>
+          <a:xfrm>
+            <a:off x="0" y="2480627"/>
+            <a:ext cx="6858000" cy="7230745"/>
+          </a:xfrm>
+          <a:prstGeom prst="rect">
+            <a:avLst/>
+          </a:prstGeom>
+        </p:spPr>
+      </p:pic>
+    </p:spTree>
+    <p:extLst>
+      <p:ext uri="{BB962C8B-B14F-4D97-AF65-F5344CB8AC3E}">
+        <p14:creationId xmlns:p14="http://schemas.microsoft.com/office/powerpoint/2010/main" val="1680781032"/>
+      </p:ext>
+    </p:extLst>
+  </p:cSld>
+  <p:clrMapOvr>
+    <a:masterClrMapping/>
+  </p:clrMapOvr>
+</p:sld>
+</file>
+
+<file path=ppt/slides/slide8.xml><?xml version="1.0" encoding="utf-8"?>
+<p:sld xmlns:a="http://schemas.openxmlformats.org/drawingml/2006/main" xmlns:r="http://schemas.openxmlformats.org/officeDocument/2006/relationships" xmlns:p="http://schemas.openxmlformats.org/presentationml/2006/main">
+  <p:cSld>
+    <p:spTree>
+      <p:nvGrpSpPr>
+        <p:cNvPr id="1" name=""/>
+        <p:cNvGrpSpPr/>
+        <p:nvPr/>
+      </p:nvGrpSpPr>
+      <p:grpSpPr>
+        <a:xfrm>
+          <a:off x="0" y="0"/>
+          <a:ext cx="0" cy="0"/>
+          <a:chOff x="0" y="0"/>
+          <a:chExt cx="0" cy="0"/>
+        </a:xfrm>
+      </p:grpSpPr>
+      <p:sp>
+        <p:nvSpPr>
+          <p:cNvPr id="4" name="CaixaDeTexto 3"/>
+          <p:cNvSpPr txBox="1"/>
+          <p:nvPr/>
+        </p:nvSpPr>
+        <p:spPr>
+          <a:xfrm>
+            <a:off x="784860" y="533400"/>
+            <a:ext cx="5379720" cy="2631490"/>
+          </a:xfrm>
+          <a:prstGeom prst="rect">
+            <a:avLst/>
+          </a:prstGeom>
+          <a:noFill/>
+        </p:spPr>
+        <p:txBody>
+          <a:bodyPr wrap="square" rtlCol="0">
+            <a:spAutoFit/>
+          </a:bodyPr>
+          <a:lstStyle/>
+          <a:p>
+            <a:pPr marL="171450" indent="-171450">
+              <a:buFont typeface="Arial" panose="020B0604020202020204" pitchFamily="34" charset="0"/>
+              <a:buChar char="•"/>
+            </a:pPr>
+            <a:r>
+              <a:rPr lang="pt-BR" sz="1100" dirty="0" smtClean="0"/>
+              <a:t>Caminho 4:</a:t>
+            </a:r>
+          </a:p>
+          <a:p>
+            <a:pPr marL="628650" lvl="1" indent="-171450">
+              <a:buFont typeface="Arial" panose="020B0604020202020204" pitchFamily="34" charset="0"/>
+              <a:buChar char="•"/>
+            </a:pPr>
+            <a:r>
+              <a:rPr lang="pt-BR" sz="1100" dirty="0" smtClean="0"/>
+              <a:t>Ano 2015 a 2018</a:t>
+            </a:r>
+          </a:p>
+          <a:p>
+            <a:pPr marL="628650" lvl="1" indent="-171450">
+              <a:buFont typeface="Arial" panose="020B0604020202020204" pitchFamily="34" charset="0"/>
+              <a:buChar char="•"/>
+            </a:pPr>
+            <a:r>
+              <a:rPr lang="pt-BR" sz="1100" dirty="0" smtClean="0"/>
+              <a:t>A1_1 ==1 e A1_2 == 2, ou seja entrou em contato por telefone e internet</a:t>
+            </a:r>
+            <a:endParaRPr lang="pt-BR" sz="1100" dirty="0" smtClean="0"/>
+          </a:p>
+          <a:p>
+            <a:pPr marL="628650" lvl="1" indent="-171450">
+              <a:buFont typeface="Arial" panose="020B0604020202020204" pitchFamily="34" charset="0"/>
+              <a:buChar char="•"/>
+            </a:pPr>
+            <a:r>
+              <a:rPr lang="pt-BR" sz="1100" dirty="0" smtClean="0"/>
+              <a:t>E1 == 1,  E3 == 1, E7 == 1, F1 ==1 e F3 == . Ou seja, o entrevistado entrou em contato para falar sobre problemas na cobrança, para alterar plano ou condição comercial, para falar sobre problemas, solicitou instalação e solicitou reparos.</a:t>
+            </a:r>
+          </a:p>
+          <a:p>
+            <a:pPr marL="628650" lvl="1" indent="-171450">
+              <a:buFont typeface="Arial" panose="020B0604020202020204" pitchFamily="34" charset="0"/>
+              <a:buChar char="•"/>
+            </a:pPr>
+            <a:r>
+              <a:rPr lang="pt-BR" sz="1100" dirty="0" smtClean="0"/>
+              <a:t>Para os demais, considera apenas Questionamentos de Sim ou Não, sem a avaliação do atributo em caso de Sim. </a:t>
+            </a:r>
+          </a:p>
+          <a:p>
+            <a:pPr marL="628650" lvl="1" indent="-171450">
+              <a:buFont typeface="Arial" panose="020B0604020202020204" pitchFamily="34" charset="0"/>
+              <a:buChar char="•"/>
+            </a:pPr>
+            <a:r>
+              <a:rPr lang="pt-BR" sz="1100" dirty="0" smtClean="0"/>
+              <a:t>Remoção de outros atributos sem relevância ou com perguntas repetidas, como CÓD_IBGE, Peso, H2a, Q7a, entre outros. </a:t>
+            </a:r>
+          </a:p>
+          <a:p>
+            <a:pPr marL="628650" lvl="1" indent="-171450">
+              <a:buFont typeface="Arial" panose="020B0604020202020204" pitchFamily="34" charset="0"/>
+              <a:buChar char="•"/>
+            </a:pPr>
+            <a:r>
+              <a:rPr lang="pt-BR" sz="1100" dirty="0" smtClean="0"/>
+              <a:t>Não Foi Considerado E5 == 1, pois gostaria de ver se existe correlação com Cancelamento do serviço. </a:t>
+            </a:r>
+          </a:p>
+          <a:p>
+            <a:pPr marL="628650" lvl="1" indent="-171450">
+              <a:buFont typeface="Arial" panose="020B0604020202020204" pitchFamily="34" charset="0"/>
+              <a:buChar char="•"/>
+            </a:pPr>
+            <a:r>
+              <a:rPr lang="pt-BR" sz="1100" dirty="0" smtClean="0"/>
+              <a:t>Total de Linhas: 518</a:t>
+            </a:r>
+            <a:endParaRPr lang="pt-BR" sz="1100" dirty="0"/>
+          </a:p>
+          <a:p>
+            <a:pPr marL="628650" lvl="1" indent="-171450">
+              <a:buFont typeface="Arial" panose="020B0604020202020204" pitchFamily="34" charset="0"/>
+              <a:buChar char="•"/>
+            </a:pPr>
+            <a:endParaRPr lang="pt-BR" sz="1100" dirty="0" smtClean="0"/>
+          </a:p>
+          <a:p>
+            <a:pPr marL="628650" lvl="1" indent="-171450">
+              <a:buFont typeface="Arial" panose="020B0604020202020204" pitchFamily="34" charset="0"/>
+              <a:buChar char="•"/>
+            </a:pPr>
+            <a:endParaRPr lang="pt-BR" sz="1100" dirty="0" smtClean="0"/>
+          </a:p>
+        </p:txBody>
+      </p:sp>
+      <p:pic>
+        <p:nvPicPr>
+          <p:cNvPr id="6" name="Imagem 5"/>
+          <p:cNvPicPr>
+            <a:picLocks noChangeAspect="1"/>
+          </p:cNvPicPr>
+          <p:nvPr/>
+        </p:nvPicPr>
+        <p:blipFill>
+          <a:blip r:embed="rId2" cstate="print">
+            <a:extLst>
+              <a:ext uri="{28A0092B-C50C-407E-A947-70E740481C1C}">
+                <a14:useLocalDpi xmlns:a14="http://schemas.microsoft.com/office/drawing/2010/main" val="0"/>
+              </a:ext>
+            </a:extLst>
+          </a:blip>
+          <a:stretch>
+            <a:fillRect/>
+          </a:stretch>
+        </p:blipFill>
+        <p:spPr>
+          <a:xfrm>
+            <a:off x="-44450" y="2937827"/>
+            <a:ext cx="6858000" cy="7230745"/>
+          </a:xfrm>
+          <a:prstGeom prst="rect">
+            <a:avLst/>
+          </a:prstGeom>
+        </p:spPr>
+      </p:pic>
+    </p:spTree>
+    <p:extLst>
+      <p:ext uri="{BB962C8B-B14F-4D97-AF65-F5344CB8AC3E}">
+        <p14:creationId xmlns:p14="http://schemas.microsoft.com/office/powerpoint/2010/main" val="2950177996"/>
+      </p:ext>
+    </p:extLst>
+  </p:cSld>
+  <p:clrMapOvr>
+    <a:masterClrMapping/>
+  </p:clrMapOvr>
+</p:sld>
+</file>
+
+<file path=ppt/slides/slide9.xml><?xml version="1.0" encoding="utf-8"?>
+<p:sld xmlns:a="http://schemas.openxmlformats.org/drawingml/2006/main" xmlns:r="http://schemas.openxmlformats.org/officeDocument/2006/relationships" xmlns:p="http://schemas.openxmlformats.org/presentationml/2006/main">
+  <p:cSld>
+    <p:spTree>
+      <p:nvGrpSpPr>
+        <p:cNvPr id="1" name=""/>
+        <p:cNvGrpSpPr/>
+        <p:nvPr/>
+      </p:nvGrpSpPr>
+      <p:grpSpPr>
+        <a:xfrm>
+          <a:off x="0" y="0"/>
+          <a:ext cx="0" cy="0"/>
+          <a:chOff x="0" y="0"/>
+          <a:chExt cx="0" cy="0"/>
+        </a:xfrm>
+      </p:grpSpPr>
+    </p:spTree>
+    <p:extLst>
+      <p:ext uri="{BB962C8B-B14F-4D97-AF65-F5344CB8AC3E}">
+        <p14:creationId xmlns:p14="http://schemas.microsoft.com/office/powerpoint/2010/main" val="3826918409"/>
       </p:ext>
     </p:extLst>
   </p:cSld>

</xml_diff>

<commit_message>
Técinas de predição iniciais, KNN, SVM e Logistic Regression
</commit_message>
<xml_diff>
--- a/Fluxo_Pesquisa.pptx
+++ b/Fluxo_Pesquisa.pptx
@@ -9,12 +9,19 @@
     <p:sldId id="257" r:id="rId3"/>
     <p:sldId id="258" r:id="rId4"/>
     <p:sldId id="259" r:id="rId5"/>
-    <p:sldId id="265" r:id="rId6"/>
-    <p:sldId id="260" r:id="rId7"/>
-    <p:sldId id="261" r:id="rId8"/>
-    <p:sldId id="263" r:id="rId9"/>
-    <p:sldId id="264" r:id="rId10"/>
-    <p:sldId id="262" r:id="rId11"/>
+    <p:sldId id="266" r:id="rId6"/>
+    <p:sldId id="265" r:id="rId7"/>
+    <p:sldId id="267" r:id="rId8"/>
+    <p:sldId id="268" r:id="rId9"/>
+    <p:sldId id="269" r:id="rId10"/>
+    <p:sldId id="270" r:id="rId11"/>
+    <p:sldId id="271" r:id="rId12"/>
+    <p:sldId id="272" r:id="rId13"/>
+    <p:sldId id="260" r:id="rId14"/>
+    <p:sldId id="261" r:id="rId15"/>
+    <p:sldId id="263" r:id="rId16"/>
+    <p:sldId id="264" r:id="rId17"/>
+    <p:sldId id="262" r:id="rId18"/>
   </p:sldIdLst>
   <p:sldSz cx="6858000" cy="9906000" type="A4"/>
   <p:notesSz cx="6858000" cy="9144000"/>
@@ -252,7 +259,7 @@
           <a:p>
             <a:fld id="{A14DA654-4032-48DC-B1A3-5B71DA7F5F6B}" type="datetimeFigureOut">
               <a:rPr lang="pt-BR" smtClean="0"/>
-              <a:t>22/08/2021</a:t>
+              <a:t>28/08/2021</a:t>
             </a:fld>
             <a:endParaRPr lang="pt-BR"/>
           </a:p>
@@ -422,7 +429,7 @@
           <a:p>
             <a:fld id="{A14DA654-4032-48DC-B1A3-5B71DA7F5F6B}" type="datetimeFigureOut">
               <a:rPr lang="pt-BR" smtClean="0"/>
-              <a:t>22/08/2021</a:t>
+              <a:t>28/08/2021</a:t>
             </a:fld>
             <a:endParaRPr lang="pt-BR"/>
           </a:p>
@@ -602,7 +609,7 @@
           <a:p>
             <a:fld id="{A14DA654-4032-48DC-B1A3-5B71DA7F5F6B}" type="datetimeFigureOut">
               <a:rPr lang="pt-BR" smtClean="0"/>
-              <a:t>22/08/2021</a:t>
+              <a:t>28/08/2021</a:t>
             </a:fld>
             <a:endParaRPr lang="pt-BR"/>
           </a:p>
@@ -772,7 +779,7 @@
           <a:p>
             <a:fld id="{A14DA654-4032-48DC-B1A3-5B71DA7F5F6B}" type="datetimeFigureOut">
               <a:rPr lang="pt-BR" smtClean="0"/>
-              <a:t>22/08/2021</a:t>
+              <a:t>28/08/2021</a:t>
             </a:fld>
             <a:endParaRPr lang="pt-BR"/>
           </a:p>
@@ -1016,7 +1023,7 @@
           <a:p>
             <a:fld id="{A14DA654-4032-48DC-B1A3-5B71DA7F5F6B}" type="datetimeFigureOut">
               <a:rPr lang="pt-BR" smtClean="0"/>
-              <a:t>22/08/2021</a:t>
+              <a:t>28/08/2021</a:t>
             </a:fld>
             <a:endParaRPr lang="pt-BR"/>
           </a:p>
@@ -1248,7 +1255,7 @@
           <a:p>
             <a:fld id="{A14DA654-4032-48DC-B1A3-5B71DA7F5F6B}" type="datetimeFigureOut">
               <a:rPr lang="pt-BR" smtClean="0"/>
-              <a:t>22/08/2021</a:t>
+              <a:t>28/08/2021</a:t>
             </a:fld>
             <a:endParaRPr lang="pt-BR"/>
           </a:p>
@@ -1615,7 +1622,7 @@
           <a:p>
             <a:fld id="{A14DA654-4032-48DC-B1A3-5B71DA7F5F6B}" type="datetimeFigureOut">
               <a:rPr lang="pt-BR" smtClean="0"/>
-              <a:t>22/08/2021</a:t>
+              <a:t>28/08/2021</a:t>
             </a:fld>
             <a:endParaRPr lang="pt-BR"/>
           </a:p>
@@ -1733,7 +1740,7 @@
           <a:p>
             <a:fld id="{A14DA654-4032-48DC-B1A3-5B71DA7F5F6B}" type="datetimeFigureOut">
               <a:rPr lang="pt-BR" smtClean="0"/>
-              <a:t>22/08/2021</a:t>
+              <a:t>28/08/2021</a:t>
             </a:fld>
             <a:endParaRPr lang="pt-BR"/>
           </a:p>
@@ -1828,7 +1835,7 @@
           <a:p>
             <a:fld id="{A14DA654-4032-48DC-B1A3-5B71DA7F5F6B}" type="datetimeFigureOut">
               <a:rPr lang="pt-BR" smtClean="0"/>
-              <a:t>22/08/2021</a:t>
+              <a:t>28/08/2021</a:t>
             </a:fld>
             <a:endParaRPr lang="pt-BR"/>
           </a:p>
@@ -2105,7 +2112,7 @@
           <a:p>
             <a:fld id="{A14DA654-4032-48DC-B1A3-5B71DA7F5F6B}" type="datetimeFigureOut">
               <a:rPr lang="pt-BR" smtClean="0"/>
-              <a:t>22/08/2021</a:t>
+              <a:t>28/08/2021</a:t>
             </a:fld>
             <a:endParaRPr lang="pt-BR"/>
           </a:p>
@@ -2362,7 +2369,7 @@
           <a:p>
             <a:fld id="{A14DA654-4032-48DC-B1A3-5B71DA7F5F6B}" type="datetimeFigureOut">
               <a:rPr lang="pt-BR" smtClean="0"/>
-              <a:t>22/08/2021</a:t>
+              <a:t>28/08/2021</a:t>
             </a:fld>
             <a:endParaRPr lang="pt-BR"/>
           </a:p>
@@ -2575,7 +2582,7 @@
           <a:p>
             <a:fld id="{A14DA654-4032-48DC-B1A3-5B71DA7F5F6B}" type="datetimeFigureOut">
               <a:rPr lang="pt-BR" smtClean="0"/>
-              <a:t>22/08/2021</a:t>
+              <a:t>28/08/2021</a:t>
             </a:fld>
             <a:endParaRPr lang="pt-BR"/>
           </a:p>
@@ -5761,6 +5768,1350 @@
           <a:chExt cx="0" cy="0"/>
         </a:xfrm>
       </p:grpSpPr>
+      <p:pic>
+        <p:nvPicPr>
+          <p:cNvPr id="4" name="Imagem 3"/>
+          <p:cNvPicPr>
+            <a:picLocks noChangeAspect="1"/>
+          </p:cNvPicPr>
+          <p:nvPr/>
+        </p:nvPicPr>
+        <p:blipFill>
+          <a:blip r:embed="rId2" cstate="print">
+            <a:extLst>
+              <a:ext uri="{28A0092B-C50C-407E-A947-70E740481C1C}">
+                <a14:useLocalDpi xmlns:a14="http://schemas.microsoft.com/office/drawing/2010/main" val="0"/>
+              </a:ext>
+            </a:extLst>
+          </a:blip>
+          <a:stretch>
+            <a:fillRect/>
+          </a:stretch>
+        </p:blipFill>
+        <p:spPr>
+          <a:xfrm>
+            <a:off x="0" y="1893184"/>
+            <a:ext cx="6858000" cy="6018031"/>
+          </a:xfrm>
+          <a:prstGeom prst="rect">
+            <a:avLst/>
+          </a:prstGeom>
+        </p:spPr>
+      </p:pic>
+    </p:spTree>
+    <p:extLst>
+      <p:ext uri="{BB962C8B-B14F-4D97-AF65-F5344CB8AC3E}">
+        <p14:creationId xmlns:p14="http://schemas.microsoft.com/office/powerpoint/2010/main" val="885248091"/>
+      </p:ext>
+    </p:extLst>
+  </p:cSld>
+  <p:clrMapOvr>
+    <a:masterClrMapping/>
+  </p:clrMapOvr>
+</p:sld>
+</file>
+
+<file path=ppt/slides/slide11.xml><?xml version="1.0" encoding="utf-8"?>
+<p:sld xmlns:a="http://schemas.openxmlformats.org/drawingml/2006/main" xmlns:r="http://schemas.openxmlformats.org/officeDocument/2006/relationships" xmlns:p="http://schemas.openxmlformats.org/presentationml/2006/main">
+  <p:cSld>
+    <p:spTree>
+      <p:nvGrpSpPr>
+        <p:cNvPr id="1" name=""/>
+        <p:cNvGrpSpPr/>
+        <p:nvPr/>
+      </p:nvGrpSpPr>
+      <p:grpSpPr>
+        <a:xfrm>
+          <a:off x="0" y="0"/>
+          <a:ext cx="0" cy="0"/>
+          <a:chOff x="0" y="0"/>
+          <a:chExt cx="0" cy="0"/>
+        </a:xfrm>
+      </p:grpSpPr>
+      <p:pic>
+        <p:nvPicPr>
+          <p:cNvPr id="4" name="Imagem 3"/>
+          <p:cNvPicPr>
+            <a:picLocks noChangeAspect="1"/>
+          </p:cNvPicPr>
+          <p:nvPr/>
+        </p:nvPicPr>
+        <p:blipFill>
+          <a:blip r:embed="rId2" cstate="print">
+            <a:extLst>
+              <a:ext uri="{28A0092B-C50C-407E-A947-70E740481C1C}">
+                <a14:useLocalDpi xmlns:a14="http://schemas.microsoft.com/office/drawing/2010/main" val="0"/>
+              </a:ext>
+            </a:extLst>
+          </a:blip>
+          <a:stretch>
+            <a:fillRect/>
+          </a:stretch>
+        </p:blipFill>
+        <p:spPr>
+          <a:xfrm>
+            <a:off x="0" y="1348025"/>
+            <a:ext cx="6858000" cy="7209950"/>
+          </a:xfrm>
+          <a:prstGeom prst="rect">
+            <a:avLst/>
+          </a:prstGeom>
+        </p:spPr>
+      </p:pic>
+    </p:spTree>
+    <p:extLst>
+      <p:ext uri="{BB962C8B-B14F-4D97-AF65-F5344CB8AC3E}">
+        <p14:creationId xmlns:p14="http://schemas.microsoft.com/office/powerpoint/2010/main" val="3269427638"/>
+      </p:ext>
+    </p:extLst>
+  </p:cSld>
+  <p:clrMapOvr>
+    <a:masterClrMapping/>
+  </p:clrMapOvr>
+</p:sld>
+</file>
+
+<file path=ppt/slides/slide12.xml><?xml version="1.0" encoding="utf-8"?>
+<p:sld xmlns:a="http://schemas.openxmlformats.org/drawingml/2006/main" xmlns:r="http://schemas.openxmlformats.org/officeDocument/2006/relationships" xmlns:p="http://schemas.openxmlformats.org/presentationml/2006/main">
+  <p:cSld>
+    <p:spTree>
+      <p:nvGrpSpPr>
+        <p:cNvPr id="1" name=""/>
+        <p:cNvGrpSpPr/>
+        <p:nvPr/>
+      </p:nvGrpSpPr>
+      <p:grpSpPr>
+        <a:xfrm>
+          <a:off x="0" y="0"/>
+          <a:ext cx="0" cy="0"/>
+          <a:chOff x="0" y="0"/>
+          <a:chExt cx="0" cy="0"/>
+        </a:xfrm>
+      </p:grpSpPr>
+      <p:sp>
+        <p:nvSpPr>
+          <p:cNvPr id="4" name="CaixaDeTexto 3"/>
+          <p:cNvSpPr txBox="1"/>
+          <p:nvPr/>
+        </p:nvSpPr>
+        <p:spPr>
+          <a:xfrm>
+            <a:off x="625642" y="360947"/>
+            <a:ext cx="1359569" cy="369332"/>
+          </a:xfrm>
+          <a:prstGeom prst="rect">
+            <a:avLst/>
+          </a:prstGeom>
+          <a:noFill/>
+        </p:spPr>
+        <p:txBody>
+          <a:bodyPr wrap="square" rtlCol="0">
+            <a:spAutoFit/>
+          </a:bodyPr>
+          <a:lstStyle/>
+          <a:p>
+            <a:pPr algn="ctr"/>
+            <a:r>
+              <a:rPr lang="pt-BR" dirty="0" smtClean="0"/>
+              <a:t>SVM</a:t>
+            </a:r>
+            <a:endParaRPr lang="pt-BR" dirty="0"/>
+          </a:p>
+        </p:txBody>
+      </p:sp>
+      <p:graphicFrame>
+        <p:nvGraphicFramePr>
+          <p:cNvPr id="5" name="Tabela 4"/>
+          <p:cNvGraphicFramePr>
+            <a:graphicFrameLocks noGrp="1"/>
+          </p:cNvGraphicFramePr>
+          <p:nvPr>
+            <p:extLst>
+              <p:ext uri="{D42A27DB-BD31-4B8C-83A1-F6EECF244321}">
+                <p14:modId xmlns:p14="http://schemas.microsoft.com/office/powerpoint/2010/main" val="2504651913"/>
+              </p:ext>
+            </p:extLst>
+          </p:nvPr>
+        </p:nvGraphicFramePr>
+        <p:xfrm>
+          <a:off x="324854" y="1155032"/>
+          <a:ext cx="2105526" cy="1239252"/>
+        </p:xfrm>
+        <a:graphic>
+          <a:graphicData uri="http://schemas.openxmlformats.org/drawingml/2006/table">
+            <a:tbl>
+              <a:tblPr firstRow="1" bandRow="1">
+                <a:tableStyleId>{5C22544A-7EE6-4342-B048-85BDC9FD1C3A}</a:tableStyleId>
+              </a:tblPr>
+              <a:tblGrid>
+                <a:gridCol w="701842"/>
+                <a:gridCol w="701842"/>
+                <a:gridCol w="701842"/>
+              </a:tblGrid>
+              <a:tr h="413084">
+                <a:tc>
+                  <a:txBody>
+                    <a:bodyPr/>
+                    <a:lstStyle/>
+                    <a:p>
+                      <a:endParaRPr lang="pt-BR" dirty="0"/>
+                    </a:p>
+                  </a:txBody>
+                  <a:tcPr/>
+                </a:tc>
+                <a:tc>
+                  <a:txBody>
+                    <a:bodyPr/>
+                    <a:lstStyle/>
+                    <a:p>
+                      <a:r>
+                        <a:rPr lang="pt-BR" dirty="0" smtClean="0"/>
+                        <a:t>0</a:t>
+                      </a:r>
+                      <a:endParaRPr lang="pt-BR" dirty="0"/>
+                    </a:p>
+                  </a:txBody>
+                  <a:tcPr/>
+                </a:tc>
+                <a:tc>
+                  <a:txBody>
+                    <a:bodyPr/>
+                    <a:lstStyle/>
+                    <a:p>
+                      <a:r>
+                        <a:rPr lang="pt-BR" dirty="0" smtClean="0"/>
+                        <a:t>1</a:t>
+                      </a:r>
+                      <a:endParaRPr lang="pt-BR" dirty="0"/>
+                    </a:p>
+                  </a:txBody>
+                  <a:tcPr/>
+                </a:tc>
+              </a:tr>
+              <a:tr h="413084">
+                <a:tc>
+                  <a:txBody>
+                    <a:bodyPr/>
+                    <a:lstStyle/>
+                    <a:p>
+                      <a:r>
+                        <a:rPr lang="pt-BR" dirty="0" smtClean="0"/>
+                        <a:t>0</a:t>
+                      </a:r>
+                      <a:endParaRPr lang="pt-BR" dirty="0"/>
+                    </a:p>
+                  </a:txBody>
+                  <a:tcPr/>
+                </a:tc>
+                <a:tc>
+                  <a:txBody>
+                    <a:bodyPr/>
+                    <a:lstStyle/>
+                    <a:p>
+                      <a:r>
+                        <a:rPr lang="pt-BR" dirty="0" smtClean="0"/>
+                        <a:t>4062</a:t>
+                      </a:r>
+                      <a:endParaRPr lang="pt-BR" dirty="0"/>
+                    </a:p>
+                  </a:txBody>
+                  <a:tcPr/>
+                </a:tc>
+                <a:tc>
+                  <a:txBody>
+                    <a:bodyPr/>
+                    <a:lstStyle/>
+                    <a:p>
+                      <a:r>
+                        <a:rPr lang="pt-BR" dirty="0" smtClean="0"/>
+                        <a:t>352</a:t>
+                      </a:r>
+                      <a:endParaRPr lang="pt-BR" dirty="0"/>
+                    </a:p>
+                  </a:txBody>
+                  <a:tcPr/>
+                </a:tc>
+              </a:tr>
+              <a:tr h="413084">
+                <a:tc>
+                  <a:txBody>
+                    <a:bodyPr/>
+                    <a:lstStyle/>
+                    <a:p>
+                      <a:r>
+                        <a:rPr lang="pt-BR" dirty="0" smtClean="0"/>
+                        <a:t>1</a:t>
+                      </a:r>
+                      <a:endParaRPr lang="pt-BR" dirty="0"/>
+                    </a:p>
+                  </a:txBody>
+                  <a:tcPr/>
+                </a:tc>
+                <a:tc>
+                  <a:txBody>
+                    <a:bodyPr/>
+                    <a:lstStyle/>
+                    <a:p>
+                      <a:r>
+                        <a:rPr lang="pt-BR" dirty="0" smtClean="0"/>
+                        <a:t>720</a:t>
+                      </a:r>
+                      <a:endParaRPr lang="pt-BR" dirty="0"/>
+                    </a:p>
+                  </a:txBody>
+                  <a:tcPr/>
+                </a:tc>
+                <a:tc>
+                  <a:txBody>
+                    <a:bodyPr/>
+                    <a:lstStyle/>
+                    <a:p>
+                      <a:r>
+                        <a:rPr lang="pt-BR" dirty="0" smtClean="0"/>
+                        <a:t>571</a:t>
+                      </a:r>
+                      <a:endParaRPr lang="pt-BR" dirty="0"/>
+                    </a:p>
+                  </a:txBody>
+                  <a:tcPr/>
+                </a:tc>
+              </a:tr>
+            </a:tbl>
+          </a:graphicData>
+        </a:graphic>
+      </p:graphicFrame>
+      <p:sp>
+        <p:nvSpPr>
+          <p:cNvPr id="7" name="CaixaDeTexto 6"/>
+          <p:cNvSpPr txBox="1"/>
+          <p:nvPr/>
+        </p:nvSpPr>
+        <p:spPr>
+          <a:xfrm>
+            <a:off x="306805" y="730279"/>
+            <a:ext cx="1997242" cy="369332"/>
+          </a:xfrm>
+          <a:prstGeom prst="rect">
+            <a:avLst/>
+          </a:prstGeom>
+          <a:noFill/>
+        </p:spPr>
+        <p:txBody>
+          <a:bodyPr wrap="square" rtlCol="0">
+            <a:spAutoFit/>
+          </a:bodyPr>
+          <a:lstStyle/>
+          <a:p>
+            <a:r>
+              <a:rPr lang="pt-BR" dirty="0" smtClean="0"/>
+              <a:t>Matriz</a:t>
+            </a:r>
+            <a:endParaRPr lang="pt-BR" dirty="0"/>
+          </a:p>
+        </p:txBody>
+      </p:sp>
+      <p:sp>
+        <p:nvSpPr>
+          <p:cNvPr id="8" name="Retângulo 7"/>
+          <p:cNvSpPr/>
+          <p:nvPr/>
+        </p:nvSpPr>
+        <p:spPr>
+          <a:xfrm>
+            <a:off x="90237" y="2500246"/>
+            <a:ext cx="3429000" cy="369332"/>
+          </a:xfrm>
+          <a:prstGeom prst="rect">
+            <a:avLst/>
+          </a:prstGeom>
+        </p:spPr>
+        <p:txBody>
+          <a:bodyPr>
+            <a:spAutoFit/>
+          </a:bodyPr>
+          <a:lstStyle/>
+          <a:p>
+            <a:r>
+              <a:rPr lang="pt-BR" dirty="0" err="1">
+                <a:latin typeface="Consolas" panose="020B0609020204030204" pitchFamily="49" charset="0"/>
+              </a:rPr>
+              <a:t>Accuracy</a:t>
+            </a:r>
+            <a:r>
+              <a:rPr lang="pt-BR" dirty="0">
+                <a:latin typeface="Consolas" panose="020B0609020204030204" pitchFamily="49" charset="0"/>
+              </a:rPr>
+              <a:t>: </a:t>
+            </a:r>
+            <a:r>
+              <a:rPr lang="pt-BR" dirty="0" smtClean="0">
+                <a:latin typeface="Consolas" panose="020B0609020204030204" pitchFamily="49" charset="0"/>
+              </a:rPr>
+              <a:t>0.812094653812</a:t>
+            </a:r>
+            <a:endParaRPr lang="pt-BR" dirty="0"/>
+          </a:p>
+        </p:txBody>
+      </p:sp>
+      <p:sp>
+        <p:nvSpPr>
+          <p:cNvPr id="9" name="CaixaDeTexto 8"/>
+          <p:cNvSpPr txBox="1"/>
+          <p:nvPr/>
+        </p:nvSpPr>
+        <p:spPr>
+          <a:xfrm>
+            <a:off x="261686" y="3268578"/>
+            <a:ext cx="2087479" cy="369332"/>
+          </a:xfrm>
+          <a:prstGeom prst="rect">
+            <a:avLst/>
+          </a:prstGeom>
+          <a:noFill/>
+        </p:spPr>
+        <p:txBody>
+          <a:bodyPr wrap="square" rtlCol="0">
+            <a:spAutoFit/>
+          </a:bodyPr>
+          <a:lstStyle/>
+          <a:p>
+            <a:pPr algn="ctr"/>
+            <a:r>
+              <a:rPr lang="pt-BR" dirty="0" smtClean="0"/>
+              <a:t>Regressão </a:t>
+            </a:r>
+            <a:r>
+              <a:rPr lang="pt-BR" dirty="0" err="1" smtClean="0"/>
+              <a:t>Logistica</a:t>
+            </a:r>
+            <a:endParaRPr lang="pt-BR" dirty="0"/>
+          </a:p>
+        </p:txBody>
+      </p:sp>
+      <p:graphicFrame>
+        <p:nvGraphicFramePr>
+          <p:cNvPr id="10" name="Tabela 9"/>
+          <p:cNvGraphicFramePr>
+            <a:graphicFrameLocks noGrp="1"/>
+          </p:cNvGraphicFramePr>
+          <p:nvPr>
+            <p:extLst>
+              <p:ext uri="{D42A27DB-BD31-4B8C-83A1-F6EECF244321}">
+                <p14:modId xmlns:p14="http://schemas.microsoft.com/office/powerpoint/2010/main" val="370784819"/>
+              </p:ext>
+            </p:extLst>
+          </p:nvPr>
+        </p:nvGraphicFramePr>
+        <p:xfrm>
+          <a:off x="234617" y="4062663"/>
+          <a:ext cx="2105526" cy="1239252"/>
+        </p:xfrm>
+        <a:graphic>
+          <a:graphicData uri="http://schemas.openxmlformats.org/drawingml/2006/table">
+            <a:tbl>
+              <a:tblPr firstRow="1" bandRow="1">
+                <a:tableStyleId>{5C22544A-7EE6-4342-B048-85BDC9FD1C3A}</a:tableStyleId>
+              </a:tblPr>
+              <a:tblGrid>
+                <a:gridCol w="701842"/>
+                <a:gridCol w="701842"/>
+                <a:gridCol w="701842"/>
+              </a:tblGrid>
+              <a:tr h="413084">
+                <a:tc>
+                  <a:txBody>
+                    <a:bodyPr/>
+                    <a:lstStyle/>
+                    <a:p>
+                      <a:endParaRPr lang="pt-BR" dirty="0"/>
+                    </a:p>
+                  </a:txBody>
+                  <a:tcPr/>
+                </a:tc>
+                <a:tc>
+                  <a:txBody>
+                    <a:bodyPr/>
+                    <a:lstStyle/>
+                    <a:p>
+                      <a:r>
+                        <a:rPr lang="pt-BR" dirty="0" smtClean="0"/>
+                        <a:t>0</a:t>
+                      </a:r>
+                      <a:endParaRPr lang="pt-BR" dirty="0"/>
+                    </a:p>
+                  </a:txBody>
+                  <a:tcPr/>
+                </a:tc>
+                <a:tc>
+                  <a:txBody>
+                    <a:bodyPr/>
+                    <a:lstStyle/>
+                    <a:p>
+                      <a:r>
+                        <a:rPr lang="pt-BR" dirty="0" smtClean="0"/>
+                        <a:t>1</a:t>
+                      </a:r>
+                      <a:endParaRPr lang="pt-BR" dirty="0"/>
+                    </a:p>
+                  </a:txBody>
+                  <a:tcPr/>
+                </a:tc>
+              </a:tr>
+              <a:tr h="413084">
+                <a:tc>
+                  <a:txBody>
+                    <a:bodyPr/>
+                    <a:lstStyle/>
+                    <a:p>
+                      <a:r>
+                        <a:rPr lang="pt-BR" dirty="0" smtClean="0"/>
+                        <a:t>0</a:t>
+                      </a:r>
+                      <a:endParaRPr lang="pt-BR" dirty="0"/>
+                    </a:p>
+                  </a:txBody>
+                  <a:tcPr/>
+                </a:tc>
+                <a:tc>
+                  <a:txBody>
+                    <a:bodyPr/>
+                    <a:lstStyle/>
+                    <a:p>
+                      <a:r>
+                        <a:rPr lang="pt-BR" dirty="0" smtClean="0"/>
+                        <a:t>4199</a:t>
+                      </a:r>
+                      <a:endParaRPr lang="pt-BR" dirty="0"/>
+                    </a:p>
+                  </a:txBody>
+                  <a:tcPr/>
+                </a:tc>
+                <a:tc>
+                  <a:txBody>
+                    <a:bodyPr/>
+                    <a:lstStyle/>
+                    <a:p>
+                      <a:r>
+                        <a:rPr lang="pt-BR" dirty="0" smtClean="0"/>
+                        <a:t>215</a:t>
+                      </a:r>
+                      <a:endParaRPr lang="pt-BR" dirty="0"/>
+                    </a:p>
+                  </a:txBody>
+                  <a:tcPr/>
+                </a:tc>
+              </a:tr>
+              <a:tr h="413084">
+                <a:tc>
+                  <a:txBody>
+                    <a:bodyPr/>
+                    <a:lstStyle/>
+                    <a:p>
+                      <a:r>
+                        <a:rPr lang="pt-BR" dirty="0" smtClean="0"/>
+                        <a:t>1</a:t>
+                      </a:r>
+                      <a:endParaRPr lang="pt-BR" dirty="0"/>
+                    </a:p>
+                  </a:txBody>
+                  <a:tcPr/>
+                </a:tc>
+                <a:tc>
+                  <a:txBody>
+                    <a:bodyPr/>
+                    <a:lstStyle/>
+                    <a:p>
+                      <a:r>
+                        <a:rPr lang="pt-BR" dirty="0" smtClean="0"/>
+                        <a:t>869</a:t>
+                      </a:r>
+                      <a:endParaRPr lang="pt-BR" dirty="0"/>
+                    </a:p>
+                  </a:txBody>
+                  <a:tcPr/>
+                </a:tc>
+                <a:tc>
+                  <a:txBody>
+                    <a:bodyPr/>
+                    <a:lstStyle/>
+                    <a:p>
+                      <a:r>
+                        <a:rPr lang="pt-BR" dirty="0" smtClean="0"/>
+                        <a:t>422</a:t>
+                      </a:r>
+                      <a:endParaRPr lang="pt-BR" dirty="0"/>
+                    </a:p>
+                  </a:txBody>
+                  <a:tcPr/>
+                </a:tc>
+              </a:tr>
+            </a:tbl>
+          </a:graphicData>
+        </a:graphic>
+      </p:graphicFrame>
+      <p:sp>
+        <p:nvSpPr>
+          <p:cNvPr id="11" name="CaixaDeTexto 10"/>
+          <p:cNvSpPr txBox="1"/>
+          <p:nvPr/>
+        </p:nvSpPr>
+        <p:spPr>
+          <a:xfrm>
+            <a:off x="216568" y="3637910"/>
+            <a:ext cx="1997242" cy="369332"/>
+          </a:xfrm>
+          <a:prstGeom prst="rect">
+            <a:avLst/>
+          </a:prstGeom>
+          <a:noFill/>
+        </p:spPr>
+        <p:txBody>
+          <a:bodyPr wrap="square" rtlCol="0">
+            <a:spAutoFit/>
+          </a:bodyPr>
+          <a:lstStyle/>
+          <a:p>
+            <a:r>
+              <a:rPr lang="pt-BR" dirty="0" smtClean="0"/>
+              <a:t>Matriz</a:t>
+            </a:r>
+            <a:endParaRPr lang="pt-BR" dirty="0"/>
+          </a:p>
+        </p:txBody>
+      </p:sp>
+      <p:sp>
+        <p:nvSpPr>
+          <p:cNvPr id="12" name="Retângulo 11"/>
+          <p:cNvSpPr/>
+          <p:nvPr/>
+        </p:nvSpPr>
+        <p:spPr>
+          <a:xfrm>
+            <a:off x="0" y="5407877"/>
+            <a:ext cx="3429000" cy="369332"/>
+          </a:xfrm>
+          <a:prstGeom prst="rect">
+            <a:avLst/>
+          </a:prstGeom>
+        </p:spPr>
+        <p:txBody>
+          <a:bodyPr>
+            <a:spAutoFit/>
+          </a:bodyPr>
+          <a:lstStyle/>
+          <a:p>
+            <a:r>
+              <a:rPr lang="pt-BR" dirty="0" err="1">
+                <a:latin typeface="Consolas" panose="020B0609020204030204" pitchFamily="49" charset="0"/>
+              </a:rPr>
+              <a:t>Accuracy</a:t>
+            </a:r>
+            <a:r>
+              <a:rPr lang="pt-BR" dirty="0">
+                <a:latin typeface="Consolas" panose="020B0609020204030204" pitchFamily="49" charset="0"/>
+              </a:rPr>
+              <a:t>: </a:t>
+            </a:r>
+            <a:r>
+              <a:rPr lang="pt-BR" dirty="0" smtClean="0"/>
+              <a:t>0.8099912357581</a:t>
+            </a:r>
+            <a:endParaRPr lang="pt-BR" dirty="0"/>
+          </a:p>
+        </p:txBody>
+      </p:sp>
+    </p:spTree>
+    <p:extLst>
+      <p:ext uri="{BB962C8B-B14F-4D97-AF65-F5344CB8AC3E}">
+        <p14:creationId xmlns:p14="http://schemas.microsoft.com/office/powerpoint/2010/main" val="1468998203"/>
+      </p:ext>
+    </p:extLst>
+  </p:cSld>
+  <p:clrMapOvr>
+    <a:masterClrMapping/>
+  </p:clrMapOvr>
+</p:sld>
+</file>
+
+<file path=ppt/slides/slide13.xml><?xml version="1.0" encoding="utf-8"?>
+<p:sld xmlns:a="http://schemas.openxmlformats.org/drawingml/2006/main" xmlns:r="http://schemas.openxmlformats.org/officeDocument/2006/relationships" xmlns:p="http://schemas.openxmlformats.org/presentationml/2006/main">
+  <p:cSld>
+    <p:spTree>
+      <p:nvGrpSpPr>
+        <p:cNvPr id="1" name=""/>
+        <p:cNvGrpSpPr/>
+        <p:nvPr/>
+      </p:nvGrpSpPr>
+      <p:grpSpPr>
+        <a:xfrm>
+          <a:off x="0" y="0"/>
+          <a:ext cx="0" cy="0"/>
+          <a:chOff x="0" y="0"/>
+          <a:chExt cx="0" cy="0"/>
+        </a:xfrm>
+      </p:grpSpPr>
+      <p:sp>
+        <p:nvSpPr>
+          <p:cNvPr id="4" name="CaixaDeTexto 3"/>
+          <p:cNvSpPr txBox="1"/>
+          <p:nvPr/>
+        </p:nvSpPr>
+        <p:spPr>
+          <a:xfrm>
+            <a:off x="784860" y="533400"/>
+            <a:ext cx="5379720" cy="2631490"/>
+          </a:xfrm>
+          <a:prstGeom prst="rect">
+            <a:avLst/>
+          </a:prstGeom>
+          <a:noFill/>
+        </p:spPr>
+        <p:txBody>
+          <a:bodyPr wrap="square" rtlCol="0">
+            <a:spAutoFit/>
+          </a:bodyPr>
+          <a:lstStyle/>
+          <a:p>
+            <a:pPr marL="171450" indent="-171450">
+              <a:buFont typeface="Arial" panose="020B0604020202020204" pitchFamily="34" charset="0"/>
+              <a:buChar char="•"/>
+            </a:pPr>
+            <a:r>
+              <a:rPr lang="pt-BR" sz="1100" dirty="0" smtClean="0"/>
+              <a:t>Caminho 2:</a:t>
+            </a:r>
+          </a:p>
+          <a:p>
+            <a:pPr marL="628650" lvl="1" indent="-171450">
+              <a:buFont typeface="Arial" panose="020B0604020202020204" pitchFamily="34" charset="0"/>
+              <a:buChar char="•"/>
+            </a:pPr>
+            <a:r>
+              <a:rPr lang="pt-BR" sz="1100" dirty="0" smtClean="0"/>
+              <a:t>Anos 2015 a 2018, devido a pergunta G1 “Se existe concorrente na vizinhança”, pois as perguntas destinadas a isso eram apenas para 2019 para frente. Além disso, a pergunta sobre a área de trabalho do entrevistado muda a partir de 2020, e assim limita a quantidade de respostas. </a:t>
+            </a:r>
+          </a:p>
+          <a:p>
+            <a:pPr marL="628650" lvl="1" indent="-171450">
+              <a:buFont typeface="Arial" panose="020B0604020202020204" pitchFamily="34" charset="0"/>
+              <a:buChar char="•"/>
+            </a:pPr>
+            <a:r>
+              <a:rPr lang="pt-BR" sz="1100" dirty="0" smtClean="0"/>
+              <a:t>Considera apenas Questionamentos de Sim ou Não, sem a avaliação do atributo em caso de Sim. Por exemplo, considera apenas. </a:t>
+            </a:r>
+            <a:r>
+              <a:rPr lang="pt-BR" sz="1100" dirty="0"/>
+              <a:t>o </a:t>
+            </a:r>
+            <a:r>
+              <a:rPr lang="pt-BR" sz="1100" u="sng" dirty="0"/>
+              <a:t>E3 (TIPO 1): Descreve se o usuário entrou em contato com a prestadora citada para alterar o plano ou alguma condição comercial nos 6 meses anteriores à pesquisa</a:t>
+            </a:r>
+            <a:r>
+              <a:rPr lang="pt-BR" sz="1100" u="sng" dirty="0" smtClean="0"/>
+              <a:t> , </a:t>
+            </a:r>
+            <a:r>
+              <a:rPr lang="pt-BR" sz="1100" dirty="0"/>
+              <a:t> </a:t>
+            </a:r>
+            <a:r>
+              <a:rPr lang="pt-BR" sz="1100" dirty="0" smtClean="0"/>
+              <a:t>e o atributo E4 que questiona a avaliação do atendimento da prestadora não é considerado. </a:t>
+            </a:r>
+          </a:p>
+          <a:p>
+            <a:pPr marL="628650" lvl="1" indent="-171450">
+              <a:buFont typeface="Arial" panose="020B0604020202020204" pitchFamily="34" charset="0"/>
+              <a:buChar char="•"/>
+            </a:pPr>
+            <a:r>
+              <a:rPr lang="pt-BR" sz="1100" dirty="0" smtClean="0"/>
+              <a:t>Remoção de outros atributos sem relevância ou com perguntas repetidas, como CÓD_IBGE, Peso, H2a, Q7a, entre outros. </a:t>
+            </a:r>
+          </a:p>
+          <a:p>
+            <a:pPr marL="628650" lvl="1" indent="-171450">
+              <a:buFont typeface="Arial" panose="020B0604020202020204" pitchFamily="34" charset="0"/>
+              <a:buChar char="•"/>
+            </a:pPr>
+            <a:r>
+              <a:rPr lang="pt-BR" sz="1100" dirty="0" smtClean="0"/>
+              <a:t>Total: 101604</a:t>
+            </a:r>
+            <a:endParaRPr lang="pt-BR" sz="1100" dirty="0"/>
+          </a:p>
+          <a:p>
+            <a:pPr marL="628650" lvl="1" indent="-171450">
+              <a:buFont typeface="Arial" panose="020B0604020202020204" pitchFamily="34" charset="0"/>
+              <a:buChar char="•"/>
+            </a:pPr>
+            <a:endParaRPr lang="pt-BR" sz="1100" dirty="0" smtClean="0"/>
+          </a:p>
+          <a:p>
+            <a:pPr marL="628650" lvl="1" indent="-171450">
+              <a:buFont typeface="Arial" panose="020B0604020202020204" pitchFamily="34" charset="0"/>
+              <a:buChar char="•"/>
+            </a:pPr>
+            <a:endParaRPr lang="pt-BR" sz="1100" dirty="0" smtClean="0"/>
+          </a:p>
+        </p:txBody>
+      </p:sp>
+      <p:pic>
+        <p:nvPicPr>
+          <p:cNvPr id="2" name="Imagem 1"/>
+          <p:cNvPicPr>
+            <a:picLocks noChangeAspect="1"/>
+          </p:cNvPicPr>
+          <p:nvPr/>
+        </p:nvPicPr>
+        <p:blipFill>
+          <a:blip r:embed="rId2" cstate="print">
+            <a:extLst>
+              <a:ext uri="{28A0092B-C50C-407E-A947-70E740481C1C}">
+                <a14:useLocalDpi xmlns:a14="http://schemas.microsoft.com/office/drawing/2010/main" val="0"/>
+              </a:ext>
+            </a:extLst>
+          </a:blip>
+          <a:stretch>
+            <a:fillRect/>
+          </a:stretch>
+        </p:blipFill>
+        <p:spPr>
+          <a:xfrm>
+            <a:off x="128832" y="2850515"/>
+            <a:ext cx="6691775" cy="7055485"/>
+          </a:xfrm>
+          <a:prstGeom prst="rect">
+            <a:avLst/>
+          </a:prstGeom>
+        </p:spPr>
+      </p:pic>
+    </p:spTree>
+    <p:extLst>
+      <p:ext uri="{BB962C8B-B14F-4D97-AF65-F5344CB8AC3E}">
+        <p14:creationId xmlns:p14="http://schemas.microsoft.com/office/powerpoint/2010/main" val="2351945423"/>
+      </p:ext>
+    </p:extLst>
+  </p:cSld>
+  <p:clrMapOvr>
+    <a:masterClrMapping/>
+  </p:clrMapOvr>
+</p:sld>
+</file>
+
+<file path=ppt/slides/slide14.xml><?xml version="1.0" encoding="utf-8"?>
+<p:sld xmlns:a="http://schemas.openxmlformats.org/drawingml/2006/main" xmlns:r="http://schemas.openxmlformats.org/officeDocument/2006/relationships" xmlns:p="http://schemas.openxmlformats.org/presentationml/2006/main">
+  <p:cSld>
+    <p:spTree>
+      <p:nvGrpSpPr>
+        <p:cNvPr id="1" name=""/>
+        <p:cNvGrpSpPr/>
+        <p:nvPr/>
+      </p:nvGrpSpPr>
+      <p:grpSpPr>
+        <a:xfrm>
+          <a:off x="0" y="0"/>
+          <a:ext cx="0" cy="0"/>
+          <a:chOff x="0" y="0"/>
+          <a:chExt cx="0" cy="0"/>
+        </a:xfrm>
+      </p:grpSpPr>
+      <p:sp>
+        <p:nvSpPr>
+          <p:cNvPr id="4" name="CaixaDeTexto 3"/>
+          <p:cNvSpPr txBox="1"/>
+          <p:nvPr/>
+        </p:nvSpPr>
+        <p:spPr>
+          <a:xfrm>
+            <a:off x="784860" y="533400"/>
+            <a:ext cx="5379720" cy="1954381"/>
+          </a:xfrm>
+          <a:prstGeom prst="rect">
+            <a:avLst/>
+          </a:prstGeom>
+          <a:noFill/>
+        </p:spPr>
+        <p:txBody>
+          <a:bodyPr wrap="square" rtlCol="0">
+            <a:spAutoFit/>
+          </a:bodyPr>
+          <a:lstStyle/>
+          <a:p>
+            <a:pPr marL="171450" indent="-171450">
+              <a:buFont typeface="Arial" panose="020B0604020202020204" pitchFamily="34" charset="0"/>
+              <a:buChar char="•"/>
+            </a:pPr>
+            <a:r>
+              <a:rPr lang="pt-BR" sz="1100" dirty="0" smtClean="0"/>
+              <a:t>Caminho 3:</a:t>
+            </a:r>
+          </a:p>
+          <a:p>
+            <a:pPr marL="628650" lvl="1" indent="-171450">
+              <a:buFont typeface="Arial" panose="020B0604020202020204" pitchFamily="34" charset="0"/>
+              <a:buChar char="•"/>
+            </a:pPr>
+            <a:r>
+              <a:rPr lang="pt-BR" sz="1100" dirty="0" smtClean="0"/>
+              <a:t>Ano 2020</a:t>
+            </a:r>
+          </a:p>
+          <a:p>
+            <a:pPr marL="628650" lvl="1" indent="-171450">
+              <a:buFont typeface="Arial" panose="020B0604020202020204" pitchFamily="34" charset="0"/>
+              <a:buChar char="•"/>
+            </a:pPr>
+            <a:r>
+              <a:rPr lang="pt-BR" sz="1100" dirty="0" smtClean="0"/>
+              <a:t>Considera apenas Questionamentos de Sim ou Não, sem a avaliação do atributo em caso de Sim. Por exemplo, considera apenas. </a:t>
+            </a:r>
+            <a:r>
+              <a:rPr lang="pt-BR" sz="1100" dirty="0"/>
+              <a:t>o </a:t>
+            </a:r>
+            <a:r>
+              <a:rPr lang="pt-BR" sz="1100" u="sng" dirty="0"/>
+              <a:t>E3 (TIPO 1): Descreve se o usuário entrou em contato com a prestadora citada para alterar o plano ou alguma condição comercial nos 6 meses anteriores à pesquisa</a:t>
+            </a:r>
+            <a:r>
+              <a:rPr lang="pt-BR" sz="1100" u="sng" dirty="0" smtClean="0"/>
+              <a:t> , </a:t>
+            </a:r>
+            <a:r>
+              <a:rPr lang="pt-BR" sz="1100" dirty="0"/>
+              <a:t> </a:t>
+            </a:r>
+            <a:r>
+              <a:rPr lang="pt-BR" sz="1100" dirty="0" smtClean="0"/>
+              <a:t>e o atributo E4 que questiona a avaliação do atendimento da prestadora não é considerado. </a:t>
+            </a:r>
+          </a:p>
+          <a:p>
+            <a:pPr marL="628650" lvl="1" indent="-171450">
+              <a:buFont typeface="Arial" panose="020B0604020202020204" pitchFamily="34" charset="0"/>
+              <a:buChar char="•"/>
+            </a:pPr>
+            <a:r>
+              <a:rPr lang="pt-BR" sz="1100" dirty="0" smtClean="0"/>
+              <a:t>Remoção de outros atributos sem relevância ou com perguntas repetidas, como CÓD_IBGE, Peso, H2a, Q7a, entre outros. </a:t>
+            </a:r>
+            <a:endParaRPr lang="pt-BR" sz="1100" dirty="0"/>
+          </a:p>
+          <a:p>
+            <a:pPr marL="628650" lvl="1" indent="-171450">
+              <a:buFont typeface="Arial" panose="020B0604020202020204" pitchFamily="34" charset="0"/>
+              <a:buChar char="•"/>
+            </a:pPr>
+            <a:endParaRPr lang="pt-BR" sz="1100" dirty="0" smtClean="0"/>
+          </a:p>
+          <a:p>
+            <a:pPr marL="628650" lvl="1" indent="-171450">
+              <a:buFont typeface="Arial" panose="020B0604020202020204" pitchFamily="34" charset="0"/>
+              <a:buChar char="•"/>
+            </a:pPr>
+            <a:endParaRPr lang="pt-BR" sz="1100" dirty="0" smtClean="0"/>
+          </a:p>
+        </p:txBody>
+      </p:sp>
+      <p:pic>
+        <p:nvPicPr>
+          <p:cNvPr id="3" name="Imagem 2"/>
+          <p:cNvPicPr>
+            <a:picLocks noChangeAspect="1"/>
+          </p:cNvPicPr>
+          <p:nvPr/>
+        </p:nvPicPr>
+        <p:blipFill>
+          <a:blip r:embed="rId2" cstate="print">
+            <a:extLst>
+              <a:ext uri="{28A0092B-C50C-407E-A947-70E740481C1C}">
+                <a14:useLocalDpi xmlns:a14="http://schemas.microsoft.com/office/drawing/2010/main" val="0"/>
+              </a:ext>
+            </a:extLst>
+          </a:blip>
+          <a:stretch>
+            <a:fillRect/>
+          </a:stretch>
+        </p:blipFill>
+        <p:spPr>
+          <a:xfrm>
+            <a:off x="45720" y="2759075"/>
+            <a:ext cx="6858000" cy="7230745"/>
+          </a:xfrm>
+          <a:prstGeom prst="rect">
+            <a:avLst/>
+          </a:prstGeom>
+        </p:spPr>
+      </p:pic>
+    </p:spTree>
+    <p:extLst>
+      <p:ext uri="{BB962C8B-B14F-4D97-AF65-F5344CB8AC3E}">
+        <p14:creationId xmlns:p14="http://schemas.microsoft.com/office/powerpoint/2010/main" val="1224521833"/>
+      </p:ext>
+    </p:extLst>
+  </p:cSld>
+  <p:clrMapOvr>
+    <a:masterClrMapping/>
+  </p:clrMapOvr>
+</p:sld>
+</file>
+
+<file path=ppt/slides/slide15.xml><?xml version="1.0" encoding="utf-8"?>
+<p:sld xmlns:a="http://schemas.openxmlformats.org/drawingml/2006/main" xmlns:r="http://schemas.openxmlformats.org/officeDocument/2006/relationships" xmlns:p="http://schemas.openxmlformats.org/presentationml/2006/main">
+  <p:cSld>
+    <p:spTree>
+      <p:nvGrpSpPr>
+        <p:cNvPr id="1" name=""/>
+        <p:cNvGrpSpPr/>
+        <p:nvPr/>
+      </p:nvGrpSpPr>
+      <p:grpSpPr>
+        <a:xfrm>
+          <a:off x="0" y="0"/>
+          <a:ext cx="0" cy="0"/>
+          <a:chOff x="0" y="0"/>
+          <a:chExt cx="0" cy="0"/>
+        </a:xfrm>
+      </p:grpSpPr>
+      <p:sp>
+        <p:nvSpPr>
+          <p:cNvPr id="4" name="CaixaDeTexto 3"/>
+          <p:cNvSpPr txBox="1"/>
+          <p:nvPr/>
+        </p:nvSpPr>
+        <p:spPr>
+          <a:xfrm>
+            <a:off x="784860" y="533400"/>
+            <a:ext cx="5379720" cy="2123658"/>
+          </a:xfrm>
+          <a:prstGeom prst="rect">
+            <a:avLst/>
+          </a:prstGeom>
+          <a:noFill/>
+        </p:spPr>
+        <p:txBody>
+          <a:bodyPr wrap="square" rtlCol="0">
+            <a:spAutoFit/>
+          </a:bodyPr>
+          <a:lstStyle/>
+          <a:p>
+            <a:pPr marL="171450" indent="-171450">
+              <a:buFont typeface="Arial" panose="020B0604020202020204" pitchFamily="34" charset="0"/>
+              <a:buChar char="•"/>
+            </a:pPr>
+            <a:r>
+              <a:rPr lang="pt-BR" sz="1100" dirty="0" smtClean="0"/>
+              <a:t>Caminho 4:</a:t>
+            </a:r>
+          </a:p>
+          <a:p>
+            <a:pPr marL="628650" lvl="1" indent="-171450">
+              <a:buFont typeface="Arial" panose="020B0604020202020204" pitchFamily="34" charset="0"/>
+              <a:buChar char="•"/>
+            </a:pPr>
+            <a:r>
+              <a:rPr lang="pt-BR" sz="1100" dirty="0" smtClean="0"/>
+              <a:t>Ano 2020</a:t>
+            </a:r>
+          </a:p>
+          <a:p>
+            <a:pPr marL="628650" lvl="1" indent="-171450">
+              <a:buFont typeface="Arial" panose="020B0604020202020204" pitchFamily="34" charset="0"/>
+              <a:buChar char="•"/>
+            </a:pPr>
+            <a:r>
+              <a:rPr lang="pt-BR" sz="1100" dirty="0" smtClean="0"/>
+              <a:t>E1 == 1 e E3 == 1 (São os atributos com maiores correlações com E5 de cancelamento)</a:t>
+            </a:r>
+          </a:p>
+          <a:p>
+            <a:pPr marL="628650" lvl="1" indent="-171450">
+              <a:buFont typeface="Arial" panose="020B0604020202020204" pitchFamily="34" charset="0"/>
+              <a:buChar char="•"/>
+            </a:pPr>
+            <a:r>
+              <a:rPr lang="pt-BR" sz="1100" dirty="0" smtClean="0"/>
+              <a:t>Com E1 e E3 igual 1, considera o E2 e E4 pois são os atributos de avaliação de 1 a 10 do E1 e E3. </a:t>
+            </a:r>
+          </a:p>
+          <a:p>
+            <a:pPr marL="628650" lvl="1" indent="-171450">
+              <a:buFont typeface="Arial" panose="020B0604020202020204" pitchFamily="34" charset="0"/>
+              <a:buChar char="•"/>
+            </a:pPr>
+            <a:r>
+              <a:rPr lang="pt-BR" sz="1100" dirty="0" smtClean="0"/>
+              <a:t>Para os demais, considera apenas Questionamentos de Sim ou Não, sem a avaliação do atributo em caso de Sim. </a:t>
+            </a:r>
+          </a:p>
+          <a:p>
+            <a:pPr marL="628650" lvl="1" indent="-171450">
+              <a:buFont typeface="Arial" panose="020B0604020202020204" pitchFamily="34" charset="0"/>
+              <a:buChar char="•"/>
+            </a:pPr>
+            <a:r>
+              <a:rPr lang="pt-BR" sz="1100" dirty="0" smtClean="0"/>
+              <a:t>Remoção de outros atributos sem relevância ou com perguntas repetidas, como CÓD_IBGE, Peso, H2a, Q7a, entre outros. </a:t>
+            </a:r>
+            <a:endParaRPr lang="pt-BR" sz="1100" dirty="0"/>
+          </a:p>
+          <a:p>
+            <a:pPr marL="628650" lvl="1" indent="-171450">
+              <a:buFont typeface="Arial" panose="020B0604020202020204" pitchFamily="34" charset="0"/>
+              <a:buChar char="•"/>
+            </a:pPr>
+            <a:endParaRPr lang="pt-BR" sz="1100" dirty="0" smtClean="0"/>
+          </a:p>
+          <a:p>
+            <a:pPr marL="628650" lvl="1" indent="-171450">
+              <a:buFont typeface="Arial" panose="020B0604020202020204" pitchFamily="34" charset="0"/>
+              <a:buChar char="•"/>
+            </a:pPr>
+            <a:endParaRPr lang="pt-BR" sz="1100" dirty="0" smtClean="0"/>
+          </a:p>
+        </p:txBody>
+      </p:sp>
+      <p:pic>
+        <p:nvPicPr>
+          <p:cNvPr id="2" name="Imagem 1"/>
+          <p:cNvPicPr>
+            <a:picLocks noChangeAspect="1"/>
+          </p:cNvPicPr>
+          <p:nvPr/>
+        </p:nvPicPr>
+        <p:blipFill>
+          <a:blip r:embed="rId2" cstate="print">
+            <a:extLst>
+              <a:ext uri="{28A0092B-C50C-407E-A947-70E740481C1C}">
+                <a14:useLocalDpi xmlns:a14="http://schemas.microsoft.com/office/drawing/2010/main" val="0"/>
+              </a:ext>
+            </a:extLst>
+          </a:blip>
+          <a:stretch>
+            <a:fillRect/>
+          </a:stretch>
+        </p:blipFill>
+        <p:spPr>
+          <a:xfrm>
+            <a:off x="0" y="2480627"/>
+            <a:ext cx="6858000" cy="7230745"/>
+          </a:xfrm>
+          <a:prstGeom prst="rect">
+            <a:avLst/>
+          </a:prstGeom>
+        </p:spPr>
+      </p:pic>
+    </p:spTree>
+    <p:extLst>
+      <p:ext uri="{BB962C8B-B14F-4D97-AF65-F5344CB8AC3E}">
+        <p14:creationId xmlns:p14="http://schemas.microsoft.com/office/powerpoint/2010/main" val="1680781032"/>
+      </p:ext>
+    </p:extLst>
+  </p:cSld>
+  <p:clrMapOvr>
+    <a:masterClrMapping/>
+  </p:clrMapOvr>
+</p:sld>
+</file>
+
+<file path=ppt/slides/slide16.xml><?xml version="1.0" encoding="utf-8"?>
+<p:sld xmlns:a="http://schemas.openxmlformats.org/drawingml/2006/main" xmlns:r="http://schemas.openxmlformats.org/officeDocument/2006/relationships" xmlns:p="http://schemas.openxmlformats.org/presentationml/2006/main">
+  <p:cSld>
+    <p:spTree>
+      <p:nvGrpSpPr>
+        <p:cNvPr id="1" name=""/>
+        <p:cNvGrpSpPr/>
+        <p:nvPr/>
+      </p:nvGrpSpPr>
+      <p:grpSpPr>
+        <a:xfrm>
+          <a:off x="0" y="0"/>
+          <a:ext cx="0" cy="0"/>
+          <a:chOff x="0" y="0"/>
+          <a:chExt cx="0" cy="0"/>
+        </a:xfrm>
+      </p:grpSpPr>
+      <p:sp>
+        <p:nvSpPr>
+          <p:cNvPr id="4" name="CaixaDeTexto 3"/>
+          <p:cNvSpPr txBox="1"/>
+          <p:nvPr/>
+        </p:nvSpPr>
+        <p:spPr>
+          <a:xfrm>
+            <a:off x="784860" y="533400"/>
+            <a:ext cx="5379720" cy="2631490"/>
+          </a:xfrm>
+          <a:prstGeom prst="rect">
+            <a:avLst/>
+          </a:prstGeom>
+          <a:noFill/>
+        </p:spPr>
+        <p:txBody>
+          <a:bodyPr wrap="square" rtlCol="0">
+            <a:spAutoFit/>
+          </a:bodyPr>
+          <a:lstStyle/>
+          <a:p>
+            <a:pPr marL="171450" indent="-171450">
+              <a:buFont typeface="Arial" panose="020B0604020202020204" pitchFamily="34" charset="0"/>
+              <a:buChar char="•"/>
+            </a:pPr>
+            <a:r>
+              <a:rPr lang="pt-BR" sz="1100" dirty="0" smtClean="0"/>
+              <a:t>Caminho 5:</a:t>
+            </a:r>
+          </a:p>
+          <a:p>
+            <a:pPr marL="628650" lvl="1" indent="-171450">
+              <a:buFont typeface="Arial" panose="020B0604020202020204" pitchFamily="34" charset="0"/>
+              <a:buChar char="•"/>
+            </a:pPr>
+            <a:r>
+              <a:rPr lang="pt-BR" sz="1100" dirty="0" smtClean="0"/>
+              <a:t>Ano 2015 a 2018</a:t>
+            </a:r>
+          </a:p>
+          <a:p>
+            <a:pPr marL="628650" lvl="1" indent="-171450">
+              <a:buFont typeface="Arial" panose="020B0604020202020204" pitchFamily="34" charset="0"/>
+              <a:buChar char="•"/>
+            </a:pPr>
+            <a:r>
+              <a:rPr lang="pt-BR" sz="1100" dirty="0" smtClean="0"/>
+              <a:t>A1_1 ==1 e A1_2 == 2, ou seja entrou em contato por telefone e internet</a:t>
+            </a:r>
+          </a:p>
+          <a:p>
+            <a:pPr marL="628650" lvl="1" indent="-171450">
+              <a:buFont typeface="Arial" panose="020B0604020202020204" pitchFamily="34" charset="0"/>
+              <a:buChar char="•"/>
+            </a:pPr>
+            <a:r>
+              <a:rPr lang="pt-BR" sz="1100" dirty="0" smtClean="0"/>
+              <a:t>E1 == 1,  E3 == 1, E7 == 1, F1 ==1 e F3 == . Ou seja, o entrevistado entrou em contato para falar sobre problemas na cobrança, para alterar plano ou condição comercial, para falar sobre problemas, solicitou instalação e solicitou reparos.</a:t>
+            </a:r>
+          </a:p>
+          <a:p>
+            <a:pPr marL="628650" lvl="1" indent="-171450">
+              <a:buFont typeface="Arial" panose="020B0604020202020204" pitchFamily="34" charset="0"/>
+              <a:buChar char="•"/>
+            </a:pPr>
+            <a:r>
+              <a:rPr lang="pt-BR" sz="1100" dirty="0" smtClean="0"/>
+              <a:t>Para os demais, considera apenas Questionamentos de Sim ou Não, sem a avaliação do atributo em caso de Sim. </a:t>
+            </a:r>
+          </a:p>
+          <a:p>
+            <a:pPr marL="628650" lvl="1" indent="-171450">
+              <a:buFont typeface="Arial" panose="020B0604020202020204" pitchFamily="34" charset="0"/>
+              <a:buChar char="•"/>
+            </a:pPr>
+            <a:r>
+              <a:rPr lang="pt-BR" sz="1100" dirty="0" smtClean="0"/>
+              <a:t>Remoção de outros atributos sem relevância ou com perguntas repetidas, como CÓD_IBGE, Peso, H2a, Q7a, entre outros. </a:t>
+            </a:r>
+          </a:p>
+          <a:p>
+            <a:pPr marL="628650" lvl="1" indent="-171450">
+              <a:buFont typeface="Arial" panose="020B0604020202020204" pitchFamily="34" charset="0"/>
+              <a:buChar char="•"/>
+            </a:pPr>
+            <a:r>
+              <a:rPr lang="pt-BR" sz="1100" dirty="0" smtClean="0"/>
+              <a:t>Não Foi Considerado E5 == 1, pois gostaria de ver se existe correlação com Cancelamento do serviço. </a:t>
+            </a:r>
+          </a:p>
+          <a:p>
+            <a:pPr marL="628650" lvl="1" indent="-171450">
+              <a:buFont typeface="Arial" panose="020B0604020202020204" pitchFamily="34" charset="0"/>
+              <a:buChar char="•"/>
+            </a:pPr>
+            <a:r>
+              <a:rPr lang="pt-BR" sz="1100" dirty="0" smtClean="0"/>
+              <a:t>Total de Linhas: 518</a:t>
+            </a:r>
+            <a:endParaRPr lang="pt-BR" sz="1100" dirty="0"/>
+          </a:p>
+          <a:p>
+            <a:pPr marL="628650" lvl="1" indent="-171450">
+              <a:buFont typeface="Arial" panose="020B0604020202020204" pitchFamily="34" charset="0"/>
+              <a:buChar char="•"/>
+            </a:pPr>
+            <a:endParaRPr lang="pt-BR" sz="1100" dirty="0" smtClean="0"/>
+          </a:p>
+          <a:p>
+            <a:pPr marL="628650" lvl="1" indent="-171450">
+              <a:buFont typeface="Arial" panose="020B0604020202020204" pitchFamily="34" charset="0"/>
+              <a:buChar char="•"/>
+            </a:pPr>
+            <a:endParaRPr lang="pt-BR" sz="1100" dirty="0" smtClean="0"/>
+          </a:p>
+        </p:txBody>
+      </p:sp>
+      <p:pic>
+        <p:nvPicPr>
+          <p:cNvPr id="6" name="Imagem 5"/>
+          <p:cNvPicPr>
+            <a:picLocks noChangeAspect="1"/>
+          </p:cNvPicPr>
+          <p:nvPr/>
+        </p:nvPicPr>
+        <p:blipFill>
+          <a:blip r:embed="rId2" cstate="print">
+            <a:extLst>
+              <a:ext uri="{28A0092B-C50C-407E-A947-70E740481C1C}">
+                <a14:useLocalDpi xmlns:a14="http://schemas.microsoft.com/office/drawing/2010/main" val="0"/>
+              </a:ext>
+            </a:extLst>
+          </a:blip>
+          <a:stretch>
+            <a:fillRect/>
+          </a:stretch>
+        </p:blipFill>
+        <p:spPr>
+          <a:xfrm>
+            <a:off x="-44450" y="2937827"/>
+            <a:ext cx="6858000" cy="7230745"/>
+          </a:xfrm>
+          <a:prstGeom prst="rect">
+            <a:avLst/>
+          </a:prstGeom>
+        </p:spPr>
+      </p:pic>
+    </p:spTree>
+    <p:extLst>
+      <p:ext uri="{BB962C8B-B14F-4D97-AF65-F5344CB8AC3E}">
+        <p14:creationId xmlns:p14="http://schemas.microsoft.com/office/powerpoint/2010/main" val="2950177996"/>
+      </p:ext>
+    </p:extLst>
+  </p:cSld>
+  <p:clrMapOvr>
+    <a:masterClrMapping/>
+  </p:clrMapOvr>
+</p:sld>
+</file>
+
+<file path=ppt/slides/slide17.xml><?xml version="1.0" encoding="utf-8"?>
+<p:sld xmlns:a="http://schemas.openxmlformats.org/drawingml/2006/main" xmlns:r="http://schemas.openxmlformats.org/officeDocument/2006/relationships" xmlns:p="http://schemas.openxmlformats.org/presentationml/2006/main">
+  <p:cSld>
+    <p:spTree>
+      <p:nvGrpSpPr>
+        <p:cNvPr id="1" name=""/>
+        <p:cNvGrpSpPr/>
+        <p:nvPr/>
+      </p:nvGrpSpPr>
+      <p:grpSpPr>
+        <a:xfrm>
+          <a:off x="0" y="0"/>
+          <a:ext cx="0" cy="0"/>
+          <a:chOff x="0" y="0"/>
+          <a:chExt cx="0" cy="0"/>
+        </a:xfrm>
+      </p:grpSpPr>
     </p:spTree>
     <p:extLst>
       <p:ext uri="{BB962C8B-B14F-4D97-AF65-F5344CB8AC3E}">
@@ -13593,8 +14944,8 @@
         </p:nvSpPr>
         <p:spPr>
           <a:xfrm>
-            <a:off x="529389" y="192505"/>
-            <a:ext cx="5919537" cy="2677656"/>
+            <a:off x="69850" y="132346"/>
+            <a:ext cx="2111375" cy="261610"/>
           </a:xfrm>
           <a:prstGeom prst="rect">
             <a:avLst/>
@@ -13608,111 +14959,17 @@
           <a:lstStyle/>
           <a:p>
             <a:r>
+              <a:rPr lang="pt-BR" sz="1050" dirty="0" err="1" smtClean="0"/>
+              <a:t>Missing</a:t>
+            </a:r>
+            <a:r>
               <a:rPr lang="pt-BR" sz="1050" dirty="0" smtClean="0"/>
-              <a:t>Caminho 1:</a:t>
-            </a:r>
-          </a:p>
-          <a:p>
-            <a:pPr marL="628650" lvl="1" indent="-171450">
-              <a:buFont typeface="Arial" panose="020B0604020202020204" pitchFamily="34" charset="0"/>
-              <a:buChar char="•"/>
-            </a:pPr>
-            <a:r>
-              <a:rPr lang="pt-BR" sz="1050" dirty="0" smtClean="0"/>
-              <a:t>2017 A 2020</a:t>
-            </a:r>
-          </a:p>
-          <a:p>
-            <a:pPr marL="628650" lvl="1" indent="-171450">
-              <a:buFont typeface="Arial" panose="020B0604020202020204" pitchFamily="34" charset="0"/>
-              <a:buChar char="•"/>
-            </a:pPr>
-            <a:r>
-              <a:rPr lang="pt-BR" sz="1050" dirty="0" smtClean="0"/>
-              <a:t> </a:t>
-            </a:r>
-            <a:r>
-              <a:rPr lang="pt-BR" sz="1050" dirty="0"/>
-              <a:t>Apenas pessoas que entraram em contato por telefone (A1_1 ==1), assim as colunas com dados de avaliação foram mantidas, </a:t>
-            </a:r>
-            <a:r>
-              <a:rPr lang="pt-BR" sz="1050" dirty="0" smtClean="0"/>
-              <a:t>e A1_1 removida pois todos os valores serão iguais a 1. Esse atributo foi escolhido 78% dos entrevistados entraram em contato por telefone. </a:t>
-            </a:r>
-          </a:p>
-          <a:p>
-            <a:pPr marL="628650" lvl="1" indent="-171450">
-              <a:buFont typeface="Arial" panose="020B0604020202020204" pitchFamily="34" charset="0"/>
-              <a:buChar char="•"/>
-            </a:pPr>
-            <a:r>
-              <a:rPr lang="pt-BR" sz="1050" dirty="0" smtClean="0"/>
-              <a:t>Apenas pessoas que entraram em contato para falar sobre Cobranças (E1 ==1). 46% dos entrevistados responderam sim para essa pergunta. </a:t>
-            </a:r>
-          </a:p>
-          <a:p>
-            <a:pPr marL="628650" lvl="1" indent="-171450">
-              <a:buFont typeface="Arial" panose="020B0604020202020204" pitchFamily="34" charset="0"/>
-              <a:buChar char="•"/>
-            </a:pPr>
-            <a:r>
-              <a:rPr lang="pt-BR" sz="1050" dirty="0" smtClean="0"/>
-              <a:t>Apenas pessoas que entraram em contato para falar cobre problemas (E7 == 1). 66% dos entrevistados responderam sim para essa pergunta. </a:t>
-            </a:r>
-          </a:p>
-          <a:p>
-            <a:pPr marL="628650" lvl="1" indent="-171450">
-              <a:buFont typeface="Arial" panose="020B0604020202020204" pitchFamily="34" charset="0"/>
-              <a:buChar char="•"/>
-            </a:pPr>
-            <a:r>
-              <a:rPr lang="pt-BR" sz="1050" dirty="0" smtClean="0"/>
-              <a:t>Apenas pessoas que solicitaram serviços de reparos (F3 ==1). 48% dos entrevistados responderam sim para essa pergunta. </a:t>
-            </a:r>
-          </a:p>
-          <a:p>
-            <a:pPr marL="628650" lvl="1" indent="-171450">
-              <a:buFont typeface="Arial" panose="020B0604020202020204" pitchFamily="34" charset="0"/>
-              <a:buChar char="•"/>
-            </a:pPr>
-            <a:r>
-              <a:rPr lang="pt-BR" sz="1050" dirty="0" smtClean="0"/>
-              <a:t>Não Considera a área de trabalho do Entrevistado; </a:t>
-            </a:r>
-          </a:p>
-          <a:p>
-            <a:pPr marL="628650" lvl="1" indent="-171450">
-              <a:buFont typeface="Arial" panose="020B0604020202020204" pitchFamily="34" charset="0"/>
-              <a:buChar char="•"/>
-            </a:pPr>
-            <a:r>
-              <a:rPr lang="pt-BR" sz="1050" dirty="0" smtClean="0"/>
-              <a:t>Não Considera questões de Concorrência fornecida na vizinhança (G1)</a:t>
-            </a:r>
-          </a:p>
-          <a:p>
-            <a:pPr marL="628650" lvl="1" indent="-171450">
-              <a:buFont typeface="Arial" panose="020B0604020202020204" pitchFamily="34" charset="0"/>
-              <a:buChar char="•"/>
-            </a:pPr>
-            <a:r>
-              <a:rPr lang="pt-BR" sz="1050" dirty="0" smtClean="0"/>
-              <a:t>Total de Linhas: 19014. </a:t>
-            </a:r>
-            <a:endParaRPr lang="pt-BR" sz="1050" dirty="0"/>
-          </a:p>
-          <a:p>
-            <a:pPr marL="628650" lvl="1" indent="-171450">
-              <a:buFont typeface="Arial" panose="020B0604020202020204" pitchFamily="34" charset="0"/>
-              <a:buChar char="•"/>
-            </a:pPr>
-            <a:endParaRPr lang="pt-BR" sz="1050" dirty="0" smtClean="0"/>
-          </a:p>
-          <a:p>
-            <a:pPr marL="171450" indent="-171450">
-              <a:buFont typeface="Arial" panose="020B0604020202020204" pitchFamily="34" charset="0"/>
-              <a:buChar char="•"/>
-            </a:pPr>
+              <a:t> Data </a:t>
+            </a:r>
+            <a:r>
+              <a:rPr lang="pt-BR" sz="1050" dirty="0" err="1" smtClean="0"/>
+              <a:t>Analysis</a:t>
+            </a:r>
             <a:endParaRPr lang="pt-BR" sz="1050" dirty="0"/>
           </a:p>
         </p:txBody>
@@ -13726,7 +14983,7 @@
           <p:nvPr/>
         </p:nvPicPr>
         <p:blipFill>
-          <a:blip r:embed="rId2" cstate="print">
+          <a:blip r:embed="rId2">
             <a:extLst>
               <a:ext uri="{28A0092B-C50C-407E-A947-70E740481C1C}">
                 <a14:useLocalDpi xmlns:a14="http://schemas.microsoft.com/office/drawing/2010/main" val="0"/>
@@ -13739,18 +14996,195 @@
         </p:blipFill>
         <p:spPr>
           <a:xfrm>
-            <a:off x="0" y="2552816"/>
-            <a:ext cx="6858000" cy="7230745"/>
+            <a:off x="0" y="393956"/>
+            <a:ext cx="6858000" cy="3076365"/>
           </a:xfrm>
           <a:prstGeom prst="rect">
             <a:avLst/>
           </a:prstGeom>
         </p:spPr>
       </p:pic>
+      <p:sp>
+        <p:nvSpPr>
+          <p:cNvPr id="7" name="CaixaDeTexto 6"/>
+          <p:cNvSpPr txBox="1"/>
+          <p:nvPr/>
+        </p:nvSpPr>
+        <p:spPr>
+          <a:xfrm>
+            <a:off x="331269" y="3470321"/>
+            <a:ext cx="5919537" cy="2839239"/>
+          </a:xfrm>
+          <a:prstGeom prst="rect">
+            <a:avLst/>
+          </a:prstGeom>
+          <a:noFill/>
+        </p:spPr>
+        <p:txBody>
+          <a:bodyPr wrap="square" rtlCol="0">
+            <a:spAutoFit/>
+          </a:bodyPr>
+          <a:lstStyle/>
+          <a:p>
+            <a:r>
+              <a:rPr lang="pt-BR" sz="1050" dirty="0" smtClean="0"/>
+              <a:t>Considerações</a:t>
+            </a:r>
+          </a:p>
+          <a:p>
+            <a:pPr marL="628650" lvl="1" indent="-171450">
+              <a:buFont typeface="Arial" panose="020B0604020202020204" pitchFamily="34" charset="0"/>
+              <a:buChar char="•"/>
+            </a:pPr>
+            <a:r>
+              <a:rPr lang="pt-BR" sz="1050" dirty="0" smtClean="0"/>
+              <a:t>Q2 respondido só de 2015 a 2019;</a:t>
+            </a:r>
+          </a:p>
+          <a:p>
+            <a:pPr marL="628650" lvl="1" indent="-171450">
+              <a:buFont typeface="Arial" panose="020B0604020202020204" pitchFamily="34" charset="0"/>
+              <a:buChar char="•"/>
+            </a:pPr>
+            <a:r>
+              <a:rPr lang="pt-BR" sz="1050" dirty="0" smtClean="0"/>
+              <a:t>Q2_1 e Q2_2 respondido só em 2020;</a:t>
+            </a:r>
+          </a:p>
+          <a:p>
+            <a:pPr marL="628650" lvl="1" indent="-171450">
+              <a:buFont typeface="Arial" panose="020B0604020202020204" pitchFamily="34" charset="0"/>
+              <a:buChar char="•"/>
+            </a:pPr>
+            <a:r>
+              <a:rPr lang="pt-BR" sz="1050" dirty="0" smtClean="0"/>
+              <a:t>A2_1, A2_2, A2_3 e A3 apenas se respondi A1_1 com 1</a:t>
+            </a:r>
+          </a:p>
+          <a:p>
+            <a:pPr marL="628650" lvl="1" indent="-171450">
+              <a:buFont typeface="Arial" panose="020B0604020202020204" pitchFamily="34" charset="0"/>
+              <a:buChar char="•"/>
+            </a:pPr>
+            <a:r>
+              <a:rPr lang="pt-BR" sz="1050" dirty="0" smtClean="0"/>
+              <a:t>A4 apenas se responde A1_2 com 2</a:t>
+            </a:r>
+          </a:p>
+          <a:p>
+            <a:pPr marL="628650" lvl="1" indent="-171450">
+              <a:buFont typeface="Arial" panose="020B0604020202020204" pitchFamily="34" charset="0"/>
+              <a:buChar char="•"/>
+            </a:pPr>
+            <a:r>
+              <a:rPr lang="pt-BR" sz="1050" dirty="0" smtClean="0"/>
+              <a:t>E2 apenas se Responde E1 com SIM</a:t>
+            </a:r>
+          </a:p>
+          <a:p>
+            <a:pPr marL="628650" lvl="1" indent="-171450">
+              <a:buFont typeface="Arial" panose="020B0604020202020204" pitchFamily="34" charset="0"/>
+              <a:buChar char="•"/>
+            </a:pPr>
+            <a:r>
+              <a:rPr lang="pt-BR" sz="1050" dirty="0" smtClean="0"/>
+              <a:t>E4 apenas se Responde E3 com SIM</a:t>
+            </a:r>
+          </a:p>
+          <a:p>
+            <a:pPr marL="628650" lvl="1" indent="-171450">
+              <a:buFont typeface="Arial" panose="020B0604020202020204" pitchFamily="34" charset="0"/>
+              <a:buChar char="•"/>
+            </a:pPr>
+            <a:r>
+              <a:rPr lang="pt-BR" sz="1050" dirty="0" smtClean="0"/>
+              <a:t>E6 apenas se Responde E5 com SIM</a:t>
+            </a:r>
+          </a:p>
+          <a:p>
+            <a:pPr marL="628650" lvl="1" indent="-171450">
+              <a:buFont typeface="Arial" panose="020B0604020202020204" pitchFamily="34" charset="0"/>
+              <a:buChar char="•"/>
+            </a:pPr>
+            <a:r>
+              <a:rPr lang="pt-BR" sz="1050" dirty="0" smtClean="0"/>
+              <a:t>E8 apenas se Responde E7 com SIM</a:t>
+            </a:r>
+          </a:p>
+          <a:p>
+            <a:pPr marL="628650" lvl="1" indent="-171450">
+              <a:buFont typeface="Arial" panose="020B0604020202020204" pitchFamily="34" charset="0"/>
+              <a:buChar char="•"/>
+            </a:pPr>
+            <a:r>
+              <a:rPr lang="pt-BR" sz="1050" dirty="0" smtClean="0"/>
+              <a:t>E5 e E7 apenas a partir de 2017</a:t>
+            </a:r>
+          </a:p>
+          <a:p>
+            <a:pPr marL="628650" lvl="1" indent="-171450">
+              <a:buFont typeface="Arial" panose="020B0604020202020204" pitchFamily="34" charset="0"/>
+              <a:buChar char="•"/>
+            </a:pPr>
+            <a:r>
+              <a:rPr lang="pt-BR" sz="1050" dirty="0" smtClean="0"/>
+              <a:t>F2_1, F2_2 e F2_3 apenas se responde F1 com SIM</a:t>
+            </a:r>
+          </a:p>
+          <a:p>
+            <a:pPr marL="628650" lvl="1" indent="-171450">
+              <a:buFont typeface="Arial" panose="020B0604020202020204" pitchFamily="34" charset="0"/>
+              <a:buChar char="•"/>
+            </a:pPr>
+            <a:r>
+              <a:rPr lang="pt-BR" sz="1050" dirty="0" smtClean="0"/>
+              <a:t>F4_1, F4_2 e F4_3 apenas se responde F4 com SIM</a:t>
+            </a:r>
+          </a:p>
+          <a:p>
+            <a:pPr marL="628650" lvl="1" indent="-171450">
+              <a:buFont typeface="Arial" panose="020B0604020202020204" pitchFamily="34" charset="0"/>
+              <a:buChar char="•"/>
+            </a:pPr>
+            <a:r>
+              <a:rPr lang="pt-BR" sz="1050" dirty="0" smtClean="0"/>
+              <a:t>G1 apenas até 2018. </a:t>
+            </a:r>
+          </a:p>
+          <a:p>
+            <a:pPr marL="628650" lvl="1" indent="-171450">
+              <a:buFont typeface="Arial" panose="020B0604020202020204" pitchFamily="34" charset="0"/>
+              <a:buChar char="•"/>
+            </a:pPr>
+            <a:r>
+              <a:rPr lang="pt-BR" sz="1050" dirty="0" smtClean="0"/>
+              <a:t>G2_1, G2_2 e G2_3 apenas de 2019 a 2020.</a:t>
+            </a:r>
+          </a:p>
+          <a:p>
+            <a:pPr lvl="1"/>
+            <a:endParaRPr lang="pt-BR" sz="1050" dirty="0" smtClean="0"/>
+          </a:p>
+          <a:p>
+            <a:pPr marL="628650" lvl="1" indent="-171450">
+              <a:buFont typeface="Arial" panose="020B0604020202020204" pitchFamily="34" charset="0"/>
+              <a:buChar char="•"/>
+            </a:pPr>
+            <a:endParaRPr lang="pt-BR" sz="1050" dirty="0" smtClean="0"/>
+          </a:p>
+          <a:p>
+            <a:pPr marL="171450" indent="-171450">
+              <a:buFont typeface="Arial" panose="020B0604020202020204" pitchFamily="34" charset="0"/>
+              <a:buChar char="•"/>
+            </a:pPr>
+            <a:endParaRPr lang="pt-BR" sz="1050" dirty="0"/>
+          </a:p>
+        </p:txBody>
+      </p:sp>
     </p:spTree>
     <p:extLst>
       <p:ext uri="{BB962C8B-B14F-4D97-AF65-F5344CB8AC3E}">
-        <p14:creationId xmlns:p14="http://schemas.microsoft.com/office/powerpoint/2010/main" val="3532069544"/>
+        <p14:creationId xmlns:p14="http://schemas.microsoft.com/office/powerpoint/2010/main" val="179821958"/>
       </p:ext>
     </p:extLst>
   </p:cSld>
@@ -13785,8 +15219,8 @@
         </p:nvSpPr>
         <p:spPr>
           <a:xfrm>
-            <a:off x="784860" y="533400"/>
-            <a:ext cx="5379720" cy="2631490"/>
+            <a:off x="529389" y="192505"/>
+            <a:ext cx="5919537" cy="2677656"/>
           </a:xfrm>
           <a:prstGeom prst="rect">
             <a:avLst/>
@@ -13798,102 +15232,120 @@
             <a:spAutoFit/>
           </a:bodyPr>
           <a:lstStyle/>
+          <a:p>
+            <a:r>
+              <a:rPr lang="pt-BR" sz="1050" dirty="0" smtClean="0"/>
+              <a:t>Caminho 1:</a:t>
+            </a:r>
+          </a:p>
+          <a:p>
+            <a:pPr marL="628650" lvl="1" indent="-171450">
+              <a:buFont typeface="Arial" panose="020B0604020202020204" pitchFamily="34" charset="0"/>
+              <a:buChar char="•"/>
+            </a:pPr>
+            <a:r>
+              <a:rPr lang="pt-BR" sz="1050" dirty="0" smtClean="0"/>
+              <a:t>2017 A 2020</a:t>
+            </a:r>
+          </a:p>
+          <a:p>
+            <a:pPr marL="628650" lvl="1" indent="-171450">
+              <a:buFont typeface="Arial" panose="020B0604020202020204" pitchFamily="34" charset="0"/>
+              <a:buChar char="•"/>
+            </a:pPr>
+            <a:r>
+              <a:rPr lang="pt-BR" sz="1050" dirty="0" smtClean="0"/>
+              <a:t> </a:t>
+            </a:r>
+            <a:r>
+              <a:rPr lang="pt-BR" sz="1050" dirty="0"/>
+              <a:t>Apenas pessoas que entraram em contato por telefone (A1_1 ==1), assim as colunas com dados de avaliação foram mantidas, </a:t>
+            </a:r>
+            <a:r>
+              <a:rPr lang="pt-BR" sz="1050" dirty="0" smtClean="0"/>
+              <a:t>e A1_1 removida pois todos os valores serão iguais a 1. Esse atributo foi escolhido 78% dos entrevistados entraram em contato por telefone. </a:t>
+            </a:r>
+          </a:p>
+          <a:p>
+            <a:pPr marL="628650" lvl="1" indent="-171450">
+              <a:buFont typeface="Arial" panose="020B0604020202020204" pitchFamily="34" charset="0"/>
+              <a:buChar char="•"/>
+            </a:pPr>
+            <a:r>
+              <a:rPr lang="pt-BR" sz="1050" dirty="0" smtClean="0"/>
+              <a:t>Apenas pessoas que entraram em contato para falar sobre Cobranças (E1 ==1). 46% dos entrevistados responderam sim para essa pergunta. </a:t>
+            </a:r>
+          </a:p>
+          <a:p>
+            <a:pPr marL="628650" lvl="1" indent="-171450">
+              <a:buFont typeface="Arial" panose="020B0604020202020204" pitchFamily="34" charset="0"/>
+              <a:buChar char="•"/>
+            </a:pPr>
+            <a:r>
+              <a:rPr lang="pt-BR" sz="1050" dirty="0" smtClean="0"/>
+              <a:t>Apenas pessoas que entraram em contato para falar cobre problemas (E7 == 1). 66% dos entrevistados responderam sim para essa pergunta. </a:t>
+            </a:r>
+          </a:p>
+          <a:p>
+            <a:pPr marL="628650" lvl="1" indent="-171450">
+              <a:buFont typeface="Arial" panose="020B0604020202020204" pitchFamily="34" charset="0"/>
+              <a:buChar char="•"/>
+            </a:pPr>
+            <a:r>
+              <a:rPr lang="pt-BR" sz="1050" dirty="0" smtClean="0"/>
+              <a:t>Apenas pessoas que solicitaram serviços de reparos (F3 ==1). 48% dos entrevistados responderam sim para essa pergunta. </a:t>
+            </a:r>
+          </a:p>
+          <a:p>
+            <a:pPr marL="628650" lvl="1" indent="-171450">
+              <a:buFont typeface="Arial" panose="020B0604020202020204" pitchFamily="34" charset="0"/>
+              <a:buChar char="•"/>
+            </a:pPr>
+            <a:r>
+              <a:rPr lang="pt-BR" sz="1050" dirty="0" smtClean="0"/>
+              <a:t>Não Considera a área de trabalho do Entrevistado; </a:t>
+            </a:r>
+          </a:p>
+          <a:p>
+            <a:pPr marL="628650" lvl="1" indent="-171450">
+              <a:buFont typeface="Arial" panose="020B0604020202020204" pitchFamily="34" charset="0"/>
+              <a:buChar char="•"/>
+            </a:pPr>
+            <a:r>
+              <a:rPr lang="pt-BR" sz="1050" dirty="0" smtClean="0"/>
+              <a:t>Não Considera questões de Concorrência fornecida na vizinhança (G1)</a:t>
+            </a:r>
+          </a:p>
+          <a:p>
+            <a:pPr marL="628650" lvl="1" indent="-171450">
+              <a:buFont typeface="Arial" panose="020B0604020202020204" pitchFamily="34" charset="0"/>
+              <a:buChar char="•"/>
+            </a:pPr>
+            <a:r>
+              <a:rPr lang="pt-BR" sz="1050" dirty="0" smtClean="0"/>
+              <a:t>Total de Linhas: 19014. </a:t>
+            </a:r>
+            <a:endParaRPr lang="pt-BR" sz="1050" dirty="0"/>
+          </a:p>
+          <a:p>
+            <a:pPr marL="628650" lvl="1" indent="-171450">
+              <a:buFont typeface="Arial" panose="020B0604020202020204" pitchFamily="34" charset="0"/>
+              <a:buChar char="•"/>
+            </a:pPr>
+            <a:endParaRPr lang="pt-BR" sz="1050" dirty="0" smtClean="0"/>
+          </a:p>
           <a:p>
             <a:pPr marL="171450" indent="-171450">
               <a:buFont typeface="Arial" panose="020B0604020202020204" pitchFamily="34" charset="0"/>
               <a:buChar char="•"/>
             </a:pPr>
-            <a:r>
-              <a:rPr lang="pt-BR" sz="1100" dirty="0" smtClean="0"/>
-              <a:t>Caminho </a:t>
-            </a:r>
-            <a:r>
-              <a:rPr lang="pt-BR" sz="1100" dirty="0" smtClean="0"/>
-              <a:t>2:</a:t>
-            </a:r>
-            <a:endParaRPr lang="pt-BR" sz="1100" dirty="0" smtClean="0"/>
-          </a:p>
-          <a:p>
-            <a:pPr marL="628650" lvl="1" indent="-171450">
-              <a:buFont typeface="Arial" panose="020B0604020202020204" pitchFamily="34" charset="0"/>
-              <a:buChar char="•"/>
-            </a:pPr>
-            <a:r>
-              <a:rPr lang="pt-BR" sz="1100" dirty="0" smtClean="0"/>
-              <a:t>Anos 2015 a 2018, devido a pergunta G1 “Se existe concorrente na vizinhança”, pois as perguntas destinadas a isso eram apenas para 2019 para frente. Além disso, a pergunta sobre a área de trabalho do entrevistado muda a partir de 2020, e assim limita a quantidade de respostas. </a:t>
-            </a:r>
-          </a:p>
-          <a:p>
-            <a:pPr marL="628650" lvl="1" indent="-171450">
-              <a:buFont typeface="Arial" panose="020B0604020202020204" pitchFamily="34" charset="0"/>
-              <a:buChar char="•"/>
-            </a:pPr>
-            <a:r>
-              <a:rPr lang="pt-BR" sz="1100" dirty="0" smtClean="0"/>
-              <a:t>Considera apenas Questionamentos de Sim ou Não, sem a avaliação do atributo em caso de Sim. Por exemplo, considera apenas. </a:t>
-            </a:r>
-            <a:r>
-              <a:rPr lang="pt-BR" sz="1100" dirty="0"/>
-              <a:t>o </a:t>
-            </a:r>
-            <a:r>
-              <a:rPr lang="pt-BR" sz="1100" u="sng" dirty="0"/>
-              <a:t>E3 (TIPO 1): Descreve se o usuário entrou em contato com a prestadora citada para alterar o plano ou alguma condição comercial nos 6 meses anteriores à pesquisa</a:t>
-            </a:r>
-            <a:r>
-              <a:rPr lang="pt-BR" sz="1100" u="sng" dirty="0" smtClean="0"/>
-              <a:t> , </a:t>
-            </a:r>
-            <a:r>
-              <a:rPr lang="pt-BR" sz="1100" dirty="0"/>
-              <a:t> </a:t>
-            </a:r>
-            <a:r>
-              <a:rPr lang="pt-BR" sz="1100" dirty="0" smtClean="0"/>
-              <a:t>e o atributo E4 que questiona a avaliação do atendimento da prestadora não é considerado. </a:t>
-            </a:r>
-          </a:p>
-          <a:p>
-            <a:pPr marL="628650" lvl="1" indent="-171450">
-              <a:buFont typeface="Arial" panose="020B0604020202020204" pitchFamily="34" charset="0"/>
-              <a:buChar char="•"/>
-            </a:pPr>
-            <a:r>
-              <a:rPr lang="pt-BR" sz="1100" dirty="0" smtClean="0"/>
-              <a:t>Remoção de outros atributos sem relevância ou com perguntas repetidas, como CÓD_IBGE, Peso, H2a, Q7a, entre outros. </a:t>
-            </a:r>
-            <a:endParaRPr lang="pt-BR" sz="1100" dirty="0" smtClean="0"/>
-          </a:p>
-          <a:p>
-            <a:pPr marL="628650" lvl="1" indent="-171450">
-              <a:buFont typeface="Arial" panose="020B0604020202020204" pitchFamily="34" charset="0"/>
-              <a:buChar char="•"/>
-            </a:pPr>
-            <a:r>
-              <a:rPr lang="pt-BR" sz="1100" dirty="0" smtClean="0"/>
-              <a:t>Total: 101604</a:t>
-            </a:r>
-            <a:endParaRPr lang="pt-BR" sz="1100" dirty="0"/>
-          </a:p>
-          <a:p>
-            <a:pPr marL="628650" lvl="1" indent="-171450">
-              <a:buFont typeface="Arial" panose="020B0604020202020204" pitchFamily="34" charset="0"/>
-              <a:buChar char="•"/>
-            </a:pPr>
-            <a:endParaRPr lang="pt-BR" sz="1100" dirty="0" smtClean="0"/>
-          </a:p>
-          <a:p>
-            <a:pPr marL="628650" lvl="1" indent="-171450">
-              <a:buFont typeface="Arial" panose="020B0604020202020204" pitchFamily="34" charset="0"/>
-              <a:buChar char="•"/>
-            </a:pPr>
-            <a:endParaRPr lang="pt-BR" sz="1100" dirty="0" smtClean="0"/>
+            <a:endParaRPr lang="pt-BR" sz="1050" dirty="0"/>
           </a:p>
         </p:txBody>
       </p:sp>
       <p:pic>
         <p:nvPicPr>
-          <p:cNvPr id="2" name="Imagem 1"/>
+          <p:cNvPr id="5" name="Imagem 4"/>
           <p:cNvPicPr>
             <a:picLocks noChangeAspect="1"/>
           </p:cNvPicPr>
@@ -13913,8 +15365,8 @@
         </p:blipFill>
         <p:spPr>
           <a:xfrm>
-            <a:off x="128832" y="2850515"/>
-            <a:ext cx="6691775" cy="7055485"/>
+            <a:off x="0" y="2552816"/>
+            <a:ext cx="6858000" cy="7230745"/>
           </a:xfrm>
           <a:prstGeom prst="rect">
             <a:avLst/>
@@ -13924,7 +15376,7 @@
     </p:spTree>
     <p:extLst>
       <p:ext uri="{BB962C8B-B14F-4D97-AF65-F5344CB8AC3E}">
-        <p14:creationId xmlns:p14="http://schemas.microsoft.com/office/powerpoint/2010/main" val="2351945423"/>
+        <p14:creationId xmlns:p14="http://schemas.microsoft.com/office/powerpoint/2010/main" val="3532069544"/>
       </p:ext>
     </p:extLst>
   </p:cSld>
@@ -13951,112 +15403,9 @@
           <a:chExt cx="0" cy="0"/>
         </a:xfrm>
       </p:grpSpPr>
-      <p:sp>
-        <p:nvSpPr>
-          <p:cNvPr id="4" name="CaixaDeTexto 3"/>
-          <p:cNvSpPr txBox="1"/>
-          <p:nvPr/>
-        </p:nvSpPr>
-        <p:spPr>
-          <a:xfrm>
-            <a:off x="784860" y="533400"/>
-            <a:ext cx="5379720" cy="1954381"/>
-          </a:xfrm>
-          <a:prstGeom prst="rect">
-            <a:avLst/>
-          </a:prstGeom>
-          <a:noFill/>
-        </p:spPr>
-        <p:txBody>
-          <a:bodyPr wrap="square" rtlCol="0">
-            <a:spAutoFit/>
-          </a:bodyPr>
-          <a:lstStyle/>
-          <a:p>
-            <a:pPr marL="171450" indent="-171450">
-              <a:buFont typeface="Arial" panose="020B0604020202020204" pitchFamily="34" charset="0"/>
-              <a:buChar char="•"/>
-            </a:pPr>
-            <a:r>
-              <a:rPr lang="pt-BR" sz="1100" dirty="0" smtClean="0"/>
-              <a:t>Caminho </a:t>
-            </a:r>
-            <a:r>
-              <a:rPr lang="pt-BR" sz="1100" dirty="0" smtClean="0"/>
-              <a:t>3:</a:t>
-            </a:r>
-            <a:endParaRPr lang="pt-BR" sz="1100" dirty="0" smtClean="0"/>
-          </a:p>
-          <a:p>
-            <a:pPr marL="628650" lvl="1" indent="-171450">
-              <a:buFont typeface="Arial" panose="020B0604020202020204" pitchFamily="34" charset="0"/>
-              <a:buChar char="•"/>
-            </a:pPr>
-            <a:r>
-              <a:rPr lang="pt-BR" sz="1100" dirty="0" smtClean="0"/>
-              <a:t>Ano 2020</a:t>
-            </a:r>
-          </a:p>
-          <a:p>
-            <a:pPr marL="628650" lvl="1" indent="-171450">
-              <a:buFont typeface="Arial" panose="020B0604020202020204" pitchFamily="34" charset="0"/>
-              <a:buChar char="•"/>
-            </a:pPr>
-            <a:r>
-              <a:rPr lang="pt-BR" sz="1100" dirty="0" smtClean="0"/>
-              <a:t>Considera apenas Questionamentos de Sim ou Não, sem a avaliação do atributo em caso de Sim. Por exemplo, considera apenas. </a:t>
-            </a:r>
-            <a:r>
-              <a:rPr lang="pt-BR" sz="1100" dirty="0"/>
-              <a:t>o </a:t>
-            </a:r>
-            <a:r>
-              <a:rPr lang="pt-BR" sz="1100" u="sng" dirty="0"/>
-              <a:t>E3 (TIPO 1): Descreve se o usuário entrou em contato com a prestadora citada para alterar o plano ou alguma condição comercial nos 6 meses anteriores à pesquisa</a:t>
-            </a:r>
-            <a:r>
-              <a:rPr lang="pt-BR" sz="1100" u="sng" dirty="0" smtClean="0"/>
-              <a:t> , </a:t>
-            </a:r>
-            <a:r>
-              <a:rPr lang="pt-BR" sz="1100" dirty="0"/>
-              <a:t> </a:t>
-            </a:r>
-            <a:r>
-              <a:rPr lang="pt-BR" sz="1100" dirty="0" smtClean="0"/>
-              <a:t>e o atributo E4 que questiona a avaliação do atendimento da prestadora não é considerado. </a:t>
-            </a:r>
-          </a:p>
-          <a:p>
-            <a:pPr marL="628650" lvl="1" indent="-171450">
-              <a:buFont typeface="Arial" panose="020B0604020202020204" pitchFamily="34" charset="0"/>
-              <a:buChar char="•"/>
-            </a:pPr>
-            <a:r>
-              <a:rPr lang="pt-BR" sz="1100" dirty="0" smtClean="0"/>
-              <a:t>Remoção de outros atributos sem relevância ou com perguntas repetidas, como CÓD_IBGE, Peso, H2a, Q7a, entre outros. </a:t>
-            </a:r>
-            <a:endParaRPr lang="pt-BR" sz="1100" dirty="0"/>
-          </a:p>
-          <a:p>
-            <a:pPr marL="628650" lvl="1" indent="-171450">
-              <a:buFont typeface="Arial" panose="020B0604020202020204" pitchFamily="34" charset="0"/>
-              <a:buChar char="•"/>
-            </a:pPr>
-            <a:endParaRPr lang="pt-BR" sz="1100" dirty="0" smtClean="0"/>
-          </a:p>
-          <a:p>
-            <a:pPr marL="628650" lvl="1" indent="-171450">
-              <a:buFont typeface="Arial" panose="020B0604020202020204" pitchFamily="34" charset="0"/>
-              <a:buChar char="•"/>
-            </a:pPr>
-            <a:endParaRPr lang="pt-BR" sz="1100" dirty="0" smtClean="0"/>
-          </a:p>
-        </p:txBody>
-      </p:sp>
       <p:pic>
         <p:nvPicPr>
-          <p:cNvPr id="3" name="Imagem 2"/>
+          <p:cNvPr id="9" name="Imagem 8"/>
           <p:cNvPicPr>
             <a:picLocks noChangeAspect="1"/>
           </p:cNvPicPr>
@@ -14076,8 +15425,8 @@
         </p:blipFill>
         <p:spPr>
           <a:xfrm>
-            <a:off x="45720" y="2759075"/>
-            <a:ext cx="6858000" cy="7230745"/>
+            <a:off x="0" y="1116197"/>
+            <a:ext cx="6858000" cy="7241805"/>
           </a:xfrm>
           <a:prstGeom prst="rect">
             <a:avLst/>
@@ -14087,7 +15436,7 @@
     </p:spTree>
     <p:extLst>
       <p:ext uri="{BB962C8B-B14F-4D97-AF65-F5344CB8AC3E}">
-        <p14:creationId xmlns:p14="http://schemas.microsoft.com/office/powerpoint/2010/main" val="1224521833"/>
+        <p14:creationId xmlns:p14="http://schemas.microsoft.com/office/powerpoint/2010/main" val="16063196"/>
       </p:ext>
     </p:extLst>
   </p:cSld>
@@ -14114,112 +15463,9 @@
           <a:chExt cx="0" cy="0"/>
         </a:xfrm>
       </p:grpSpPr>
-      <p:sp>
-        <p:nvSpPr>
-          <p:cNvPr id="4" name="CaixaDeTexto 3"/>
-          <p:cNvSpPr txBox="1"/>
-          <p:nvPr/>
-        </p:nvSpPr>
-        <p:spPr>
-          <a:xfrm>
-            <a:off x="784860" y="533400"/>
-            <a:ext cx="5379720" cy="2123658"/>
-          </a:xfrm>
-          <a:prstGeom prst="rect">
-            <a:avLst/>
-          </a:prstGeom>
-          <a:noFill/>
-        </p:spPr>
-        <p:txBody>
-          <a:bodyPr wrap="square" rtlCol="0">
-            <a:spAutoFit/>
-          </a:bodyPr>
-          <a:lstStyle/>
-          <a:p>
-            <a:pPr marL="171450" indent="-171450">
-              <a:buFont typeface="Arial" panose="020B0604020202020204" pitchFamily="34" charset="0"/>
-              <a:buChar char="•"/>
-            </a:pPr>
-            <a:r>
-              <a:rPr lang="pt-BR" sz="1100" dirty="0" smtClean="0"/>
-              <a:t>Caminho </a:t>
-            </a:r>
-            <a:r>
-              <a:rPr lang="pt-BR" sz="1100" dirty="0" smtClean="0"/>
-              <a:t>4:</a:t>
-            </a:r>
-            <a:endParaRPr lang="pt-BR" sz="1100" dirty="0" smtClean="0"/>
-          </a:p>
-          <a:p>
-            <a:pPr marL="628650" lvl="1" indent="-171450">
-              <a:buFont typeface="Arial" panose="020B0604020202020204" pitchFamily="34" charset="0"/>
-              <a:buChar char="•"/>
-            </a:pPr>
-            <a:r>
-              <a:rPr lang="pt-BR" sz="1100" dirty="0" smtClean="0"/>
-              <a:t>Ano 2020</a:t>
-            </a:r>
-          </a:p>
-          <a:p>
-            <a:pPr marL="628650" lvl="1" indent="-171450">
-              <a:buFont typeface="Arial" panose="020B0604020202020204" pitchFamily="34" charset="0"/>
-              <a:buChar char="•"/>
-            </a:pPr>
-            <a:r>
-              <a:rPr lang="pt-BR" sz="1100" dirty="0" smtClean="0"/>
-              <a:t>E1 == 1 e E3 == 1 (São os atributos com maiores correlações com E5 de cancelamento)</a:t>
-            </a:r>
-          </a:p>
-          <a:p>
-            <a:pPr marL="628650" lvl="1" indent="-171450">
-              <a:buFont typeface="Arial" panose="020B0604020202020204" pitchFamily="34" charset="0"/>
-              <a:buChar char="•"/>
-            </a:pPr>
-            <a:r>
-              <a:rPr lang="pt-BR" sz="1100" dirty="0" smtClean="0"/>
-              <a:t>Com E1 e E3 igual 1, considera o E2 e E4 pois são os atributos de avaliação de 1 a 10 do E1 e E3. </a:t>
-            </a:r>
-          </a:p>
-          <a:p>
-            <a:pPr marL="628650" lvl="1" indent="-171450">
-              <a:buFont typeface="Arial" panose="020B0604020202020204" pitchFamily="34" charset="0"/>
-              <a:buChar char="•"/>
-            </a:pPr>
-            <a:r>
-              <a:rPr lang="pt-BR" sz="1100" dirty="0" smtClean="0"/>
-              <a:t>Para os demais, considera apenas Questionamentos de Sim ou Não, sem a avaliação do atributo em caso de Sim. </a:t>
-            </a:r>
-          </a:p>
-          <a:p>
-            <a:pPr marL="628650" lvl="1" indent="-171450">
-              <a:buFont typeface="Arial" panose="020B0604020202020204" pitchFamily="34" charset="0"/>
-              <a:buChar char="•"/>
-            </a:pPr>
-            <a:r>
-              <a:rPr lang="pt-BR" sz="1100" dirty="0" smtClean="0"/>
-              <a:t>Remoção de outros atributos sem relevância ou com perguntas repetidas, como CÓD_IBGE, Peso, H2a, Q7a, entre outros. </a:t>
-            </a:r>
-            <a:endParaRPr lang="pt-BR" sz="1100" dirty="0"/>
-          </a:p>
-          <a:p>
-            <a:pPr marL="628650" lvl="1" indent="-171450">
-              <a:buFont typeface="Arial" panose="020B0604020202020204" pitchFamily="34" charset="0"/>
-              <a:buChar char="•"/>
-            </a:pPr>
-            <a:endParaRPr lang="pt-BR" sz="1100" dirty="0" smtClean="0"/>
-          </a:p>
-          <a:p>
-            <a:pPr marL="628650" lvl="1" indent="-171450">
-              <a:buFont typeface="Arial" panose="020B0604020202020204" pitchFamily="34" charset="0"/>
-              <a:buChar char="•"/>
-            </a:pPr>
-            <a:endParaRPr lang="pt-BR" sz="1100" dirty="0" smtClean="0"/>
-          </a:p>
-        </p:txBody>
-      </p:sp>
       <p:pic>
         <p:nvPicPr>
-          <p:cNvPr id="2" name="Imagem 1"/>
+          <p:cNvPr id="4" name="Imagem 3"/>
           <p:cNvPicPr>
             <a:picLocks noChangeAspect="1"/>
           </p:cNvPicPr>
@@ -14239,8 +15485,8 @@
         </p:blipFill>
         <p:spPr>
           <a:xfrm>
-            <a:off x="0" y="2480627"/>
-            <a:ext cx="6858000" cy="7230745"/>
+            <a:off x="0" y="1333359"/>
+            <a:ext cx="6858000" cy="7239281"/>
           </a:xfrm>
           <a:prstGeom prst="rect">
             <a:avLst/>
@@ -14250,7 +15496,7 @@
     </p:spTree>
     <p:extLst>
       <p:ext uri="{BB962C8B-B14F-4D97-AF65-F5344CB8AC3E}">
-        <p14:creationId xmlns:p14="http://schemas.microsoft.com/office/powerpoint/2010/main" val="1680781032"/>
+        <p14:creationId xmlns:p14="http://schemas.microsoft.com/office/powerpoint/2010/main" val="4010333061"/>
       </p:ext>
     </p:extLst>
   </p:cSld>
@@ -14277,132 +15523,9 @@
           <a:chExt cx="0" cy="0"/>
         </a:xfrm>
       </p:grpSpPr>
-      <p:sp>
-        <p:nvSpPr>
-          <p:cNvPr id="4" name="CaixaDeTexto 3"/>
-          <p:cNvSpPr txBox="1"/>
-          <p:nvPr/>
-        </p:nvSpPr>
-        <p:spPr>
-          <a:xfrm>
-            <a:off x="784860" y="533400"/>
-            <a:ext cx="5379720" cy="2631490"/>
-          </a:xfrm>
-          <a:prstGeom prst="rect">
-            <a:avLst/>
-          </a:prstGeom>
-          <a:noFill/>
-        </p:spPr>
-        <p:txBody>
-          <a:bodyPr wrap="square" rtlCol="0">
-            <a:spAutoFit/>
-          </a:bodyPr>
-          <a:lstStyle/>
-          <a:p>
-            <a:pPr marL="171450" indent="-171450">
-              <a:buFont typeface="Arial" panose="020B0604020202020204" pitchFamily="34" charset="0"/>
-              <a:buChar char="•"/>
-            </a:pPr>
-            <a:r>
-              <a:rPr lang="pt-BR" sz="1100" dirty="0" smtClean="0"/>
-              <a:t>Caminho </a:t>
-            </a:r>
-            <a:r>
-              <a:rPr lang="pt-BR" sz="1100" dirty="0" smtClean="0"/>
-              <a:t>5:</a:t>
-            </a:r>
-            <a:endParaRPr lang="pt-BR" sz="1100" dirty="0" smtClean="0"/>
-          </a:p>
-          <a:p>
-            <a:pPr marL="628650" lvl="1" indent="-171450">
-              <a:buFont typeface="Arial" panose="020B0604020202020204" pitchFamily="34" charset="0"/>
-              <a:buChar char="•"/>
-            </a:pPr>
-            <a:r>
-              <a:rPr lang="pt-BR" sz="1100" dirty="0" smtClean="0"/>
-              <a:t>Ano 2015 a 2018</a:t>
-            </a:r>
-          </a:p>
-          <a:p>
-            <a:pPr marL="628650" lvl="1" indent="-171450">
-              <a:buFont typeface="Arial" panose="020B0604020202020204" pitchFamily="34" charset="0"/>
-              <a:buChar char="•"/>
-            </a:pPr>
-            <a:r>
-              <a:rPr lang="pt-BR" sz="1100" dirty="0" smtClean="0"/>
-              <a:t>A1_1 ==1 e A1_2 == 2, ou seja entrou em contato por telefone e internet</a:t>
-            </a:r>
-          </a:p>
-          <a:p>
-            <a:pPr marL="628650" lvl="1" indent="-171450">
-              <a:buFont typeface="Arial" panose="020B0604020202020204" pitchFamily="34" charset="0"/>
-              <a:buChar char="•"/>
-            </a:pPr>
-            <a:r>
-              <a:rPr lang="pt-BR" sz="1100" dirty="0" smtClean="0"/>
-              <a:t>E1 == 1,  E3 == 1, E7 == 1, F1 ==1 e F3 == . Ou seja, o entrevistado entrou em contato para falar sobre problemas na cobrança, para alterar plano ou condição comercial, para falar sobre problemas, solicitou instalação e solicitou reparos.</a:t>
-            </a:r>
-          </a:p>
-          <a:p>
-            <a:pPr marL="628650" lvl="1" indent="-171450">
-              <a:buFont typeface="Arial" panose="020B0604020202020204" pitchFamily="34" charset="0"/>
-              <a:buChar char="•"/>
-            </a:pPr>
-            <a:r>
-              <a:rPr lang="pt-BR" sz="1100" dirty="0" smtClean="0"/>
-              <a:t>Para os demais, considera apenas Questionamentos de Sim ou Não, sem a avaliação do atributo em caso de Sim. </a:t>
-            </a:r>
-          </a:p>
-          <a:p>
-            <a:pPr marL="628650" lvl="1" indent="-171450">
-              <a:buFont typeface="Arial" panose="020B0604020202020204" pitchFamily="34" charset="0"/>
-              <a:buChar char="•"/>
-            </a:pPr>
-            <a:r>
-              <a:rPr lang="pt-BR" sz="1100" dirty="0" smtClean="0"/>
-              <a:t>Remoção de outros atributos sem relevância ou com perguntas repetidas, como CÓD_IBGE, Peso, H2a, Q7a, entre outros. </a:t>
-            </a:r>
-          </a:p>
-          <a:p>
-            <a:pPr marL="628650" lvl="1" indent="-171450">
-              <a:buFont typeface="Arial" panose="020B0604020202020204" pitchFamily="34" charset="0"/>
-              <a:buChar char="•"/>
-            </a:pPr>
-            <a:r>
-              <a:rPr lang="pt-BR" sz="1100" dirty="0" smtClean="0"/>
-              <a:t>Não Foi Considerado E5 == 1, pois gostaria de ver se existe correlação com Cancelamento do serviço. </a:t>
-            </a:r>
-          </a:p>
-          <a:p>
-            <a:pPr marL="628650" lvl="1" indent="-171450">
-              <a:buFont typeface="Arial" panose="020B0604020202020204" pitchFamily="34" charset="0"/>
-              <a:buChar char="•"/>
-            </a:pPr>
-            <a:r>
-              <a:rPr lang="pt-BR" sz="1100" dirty="0" smtClean="0"/>
-              <a:t>Total de Linhas: 518</a:t>
-            </a:r>
-            <a:endParaRPr lang="pt-BR" sz="1100" dirty="0"/>
-          </a:p>
-          <a:p>
-            <a:pPr marL="628650" lvl="1" indent="-171450">
-              <a:buFont typeface="Arial" panose="020B0604020202020204" pitchFamily="34" charset="0"/>
-              <a:buChar char="•"/>
-            </a:pPr>
-            <a:endParaRPr lang="pt-BR" sz="1100" dirty="0" smtClean="0"/>
-          </a:p>
-          <a:p>
-            <a:pPr marL="628650" lvl="1" indent="-171450">
-              <a:buFont typeface="Arial" panose="020B0604020202020204" pitchFamily="34" charset="0"/>
-              <a:buChar char="•"/>
-            </a:pPr>
-            <a:endParaRPr lang="pt-BR" sz="1100" dirty="0" smtClean="0"/>
-          </a:p>
-        </p:txBody>
-      </p:sp>
       <p:pic>
         <p:nvPicPr>
-          <p:cNvPr id="6" name="Imagem 5"/>
+          <p:cNvPr id="4" name="Imagem 3"/>
           <p:cNvPicPr>
             <a:picLocks noChangeAspect="1"/>
           </p:cNvPicPr>
@@ -14422,8 +15545,8 @@
         </p:blipFill>
         <p:spPr>
           <a:xfrm>
-            <a:off x="-44450" y="2937827"/>
-            <a:ext cx="6858000" cy="7230745"/>
+            <a:off x="0" y="1330763"/>
+            <a:ext cx="6858000" cy="7244473"/>
           </a:xfrm>
           <a:prstGeom prst="rect">
             <a:avLst/>
@@ -14433,7 +15556,7 @@
     </p:spTree>
     <p:extLst>
       <p:ext uri="{BB962C8B-B14F-4D97-AF65-F5344CB8AC3E}">
-        <p14:creationId xmlns:p14="http://schemas.microsoft.com/office/powerpoint/2010/main" val="2950177996"/>
+        <p14:creationId xmlns:p14="http://schemas.microsoft.com/office/powerpoint/2010/main" val="4232649947"/>
       </p:ext>
     </p:extLst>
   </p:cSld>

</xml_diff>